<commit_message>
Agenda for SC20, adding it to Overview and small tweaks elsewhere
</commit_message>
<xml_diff>
--- a/presentations/01-overview.pptx
+++ b/presentations/01-overview.pptx
@@ -5,10 +5,10 @@
     <p:sldMasterId id="2147483935" r:id="rId4"/>
   </p:sldMasterIdLst>
   <p:notesMasterIdLst>
-    <p:notesMasterId r:id="rId17"/>
+    <p:notesMasterId r:id="rId18"/>
   </p:notesMasterIdLst>
   <p:handoutMasterIdLst>
-    <p:handoutMasterId r:id="rId18"/>
+    <p:handoutMasterId r:id="rId19"/>
   </p:handoutMasterIdLst>
   <p:sldIdLst>
     <p:sldId id="318" r:id="rId5"/>
@@ -23,6 +23,7 @@
     <p:sldId id="1820" r:id="rId14"/>
     <p:sldId id="279" r:id="rId15"/>
     <p:sldId id="1845" r:id="rId16"/>
+    <p:sldId id="257" r:id="rId17"/>
   </p:sldIdLst>
   <p:sldSz cx="12188825" cy="6858000"/>
   <p:notesSz cx="7010400" cy="9296400"/>
@@ -266,7 +267,7 @@
           <a:p>
             <a:fld id="{0B842F42-2CE9-4E35-95C1-410DC08A50B1}" type="datetimeFigureOut">
               <a:rPr lang="en-US" smtClean="0"/>
-              <a:t>9/30/2020</a:t>
+              <a:t>10/8/2020</a:t>
             </a:fld>
             <a:endParaRPr lang="en-US"/>
           </a:p>
@@ -431,7 +432,7 @@
           <a:p>
             <a:fld id="{6F282904-F315-4730-8D91-37D99E141A6F}" type="datetimeFigureOut">
               <a:rPr lang="en-US" smtClean="0"/>
-              <a:t>9/30/2020</a:t>
+              <a:t>10/8/2020</a:t>
             </a:fld>
             <a:endParaRPr lang="en-US"/>
           </a:p>
@@ -5033,7 +5034,7 @@
           <a:p>
             <a:r>
               <a:rPr lang="en-US" dirty="0"/>
-              <a:t>Software Process Best Practices for Scientific Software </a:t>
+              <a:t>Best Practices for Scientific Software Development</a:t>
             </a:r>
           </a:p>
         </p:txBody>
@@ -6226,6 +6227,1885 @@
     <p:extLst>
       <p:ext uri="{BB962C8B-B14F-4D97-AF65-F5344CB8AC3E}">
         <p14:creationId xmlns:p14="http://schemas.microsoft.com/office/powerpoint/2010/main" val="3932546652"/>
+      </p:ext>
+    </p:extLst>
+  </p:cSld>
+  <p:clrMapOvr>
+    <a:masterClrMapping/>
+  </p:clrMapOvr>
+</p:sld>
+</file>
+
+<file path=ppt/slides/slide13.xml><?xml version="1.0" encoding="utf-8"?>
+<p:sld xmlns:a="http://schemas.openxmlformats.org/drawingml/2006/main" xmlns:r="http://schemas.openxmlformats.org/officeDocument/2006/relationships" xmlns:p="http://schemas.openxmlformats.org/presentationml/2006/main" showMasterSp="0">
+  <p:cSld>
+    <p:spTree>
+      <p:nvGrpSpPr>
+        <p:cNvPr id="1" name=""/>
+        <p:cNvGrpSpPr/>
+        <p:nvPr/>
+      </p:nvGrpSpPr>
+      <p:grpSpPr>
+        <a:xfrm>
+          <a:off x="0" y="0"/>
+          <a:ext cx="0" cy="0"/>
+          <a:chOff x="0" y="0"/>
+          <a:chExt cx="0" cy="0"/>
+        </a:xfrm>
+      </p:grpSpPr>
+      <p:sp>
+        <p:nvSpPr>
+          <p:cNvPr id="2" name="Title 1">
+            <a:extLst>
+              <a:ext uri="{FF2B5EF4-FFF2-40B4-BE49-F238E27FC236}">
+                <a16:creationId xmlns:a16="http://schemas.microsoft.com/office/drawing/2014/main" id="{2D652AD8-340F-4E8B-B0C4-7ABAA20B6F6A}"/>
+              </a:ext>
+            </a:extLst>
+          </p:cNvPr>
+          <p:cNvSpPr>
+            <a:spLocks noGrp="1"/>
+          </p:cNvSpPr>
+          <p:nvPr>
+            <p:ph type="title"/>
+          </p:nvPr>
+        </p:nvSpPr>
+        <p:spPr/>
+        <p:txBody>
+          <a:bodyPr/>
+          <a:lstStyle/>
+          <a:p>
+            <a:r>
+              <a:rPr lang="en-US" dirty="0"/>
+              <a:t>Agenda</a:t>
+            </a:r>
+          </a:p>
+        </p:txBody>
+      </p:sp>
+      <p:graphicFrame>
+        <p:nvGraphicFramePr>
+          <p:cNvPr id="4" name="Content Placeholder 3">
+            <a:extLst>
+              <a:ext uri="{FF2B5EF4-FFF2-40B4-BE49-F238E27FC236}">
+                <a16:creationId xmlns:a16="http://schemas.microsoft.com/office/drawing/2014/main" id="{A0943BB2-2F98-4DD2-873B-1E619A0C771D}"/>
+              </a:ext>
+            </a:extLst>
+          </p:cNvPr>
+          <p:cNvGraphicFramePr>
+            <a:graphicFrameLocks noGrp="1"/>
+          </p:cNvGraphicFramePr>
+          <p:nvPr>
+            <p:ph idx="1"/>
+            <p:extLst>
+              <p:ext uri="{D42A27DB-BD31-4B8C-83A1-F6EECF244321}">
+                <p14:modId xmlns:p14="http://schemas.microsoft.com/office/powerpoint/2010/main" val="312120117"/>
+              </p:ext>
+            </p:extLst>
+          </p:nvPr>
+        </p:nvGraphicFramePr>
+        <p:xfrm>
+          <a:off x="482119" y="879117"/>
+          <a:ext cx="11224586" cy="5608320"/>
+        </p:xfrm>
+        <a:graphic>
+          <a:graphicData uri="http://schemas.openxmlformats.org/drawingml/2006/table">
+            <a:tbl>
+              <a:tblPr firstRow="1" bandRow="1">
+                <a:tableStyleId>{5C22544A-7EE6-4342-B048-85BDC9FD1C3A}</a:tableStyleId>
+              </a:tblPr>
+              <a:tblGrid>
+                <a:gridCol w="1953967">
+                  <a:extLst>
+                    <a:ext uri="{9D8B030D-6E8A-4147-A177-3AD203B41FA5}">
+                      <a16:colId xmlns:a16="http://schemas.microsoft.com/office/drawing/2014/main" val="3446576009"/>
+                    </a:ext>
+                  </a:extLst>
+                </a:gridCol>
+                <a:gridCol w="927012">
+                  <a:extLst>
+                    <a:ext uri="{9D8B030D-6E8A-4147-A177-3AD203B41FA5}">
+                      <a16:colId xmlns:a16="http://schemas.microsoft.com/office/drawing/2014/main" val="339314737"/>
+                    </a:ext>
+                  </a:extLst>
+                </a:gridCol>
+                <a:gridCol w="4502632">
+                  <a:extLst>
+                    <a:ext uri="{9D8B030D-6E8A-4147-A177-3AD203B41FA5}">
+                      <a16:colId xmlns:a16="http://schemas.microsoft.com/office/drawing/2014/main" val="1263998808"/>
+                    </a:ext>
+                  </a:extLst>
+                </a:gridCol>
+                <a:gridCol w="2566626">
+                  <a:extLst>
+                    <a:ext uri="{9D8B030D-6E8A-4147-A177-3AD203B41FA5}">
+                      <a16:colId xmlns:a16="http://schemas.microsoft.com/office/drawing/2014/main" val="4097899022"/>
+                    </a:ext>
+                  </a:extLst>
+                </a:gridCol>
+                <a:gridCol w="1274349">
+                  <a:extLst>
+                    <a:ext uri="{9D8B030D-6E8A-4147-A177-3AD203B41FA5}">
+                      <a16:colId xmlns:a16="http://schemas.microsoft.com/office/drawing/2014/main" val="2615546019"/>
+                    </a:ext>
+                  </a:extLst>
+                </a:gridCol>
+              </a:tblGrid>
+              <a:tr h="370840">
+                <a:tc>
+                  <a:txBody>
+                    <a:bodyPr/>
+                    <a:lstStyle/>
+                    <a:p>
+                      <a:pPr algn="l">
+                        <a:lnSpc>
+                          <a:spcPct val="100000"/>
+                        </a:lnSpc>
+                      </a:pPr>
+                      <a:r>
+                        <a:rPr lang="en-US" sz="1600" dirty="0"/>
+                        <a:t>Time (Eastern US)</a:t>
+                      </a:r>
+                    </a:p>
+                  </a:txBody>
+                  <a:tcPr/>
+                </a:tc>
+                <a:tc>
+                  <a:txBody>
+                    <a:bodyPr/>
+                    <a:lstStyle/>
+                    <a:p>
+                      <a:pPr>
+                        <a:lnSpc>
+                          <a:spcPct val="100000"/>
+                        </a:lnSpc>
+                      </a:pPr>
+                      <a:r>
+                        <a:rPr lang="en-US" sz="1600" dirty="0"/>
+                        <a:t>Module</a:t>
+                      </a:r>
+                    </a:p>
+                  </a:txBody>
+                  <a:tcPr/>
+                </a:tc>
+                <a:tc>
+                  <a:txBody>
+                    <a:bodyPr/>
+                    <a:lstStyle/>
+                    <a:p>
+                      <a:pPr>
+                        <a:lnSpc>
+                          <a:spcPct val="100000"/>
+                        </a:lnSpc>
+                      </a:pPr>
+                      <a:r>
+                        <a:rPr lang="en-US" sz="1600" dirty="0"/>
+                        <a:t>Topic</a:t>
+                      </a:r>
+                    </a:p>
+                  </a:txBody>
+                  <a:tcPr/>
+                </a:tc>
+                <a:tc>
+                  <a:txBody>
+                    <a:bodyPr/>
+                    <a:lstStyle/>
+                    <a:p>
+                      <a:pPr>
+                        <a:lnSpc>
+                          <a:spcPct val="100000"/>
+                        </a:lnSpc>
+                      </a:pPr>
+                      <a:r>
+                        <a:rPr lang="en-US" sz="1600" dirty="0"/>
+                        <a:t>Speaker</a:t>
+                      </a:r>
+                    </a:p>
+                  </a:txBody>
+                  <a:tcPr/>
+                </a:tc>
+                <a:tc>
+                  <a:txBody>
+                    <a:bodyPr/>
+                    <a:lstStyle/>
+                    <a:p>
+                      <a:pPr>
+                        <a:lnSpc>
+                          <a:spcPct val="100000"/>
+                        </a:lnSpc>
+                      </a:pPr>
+                      <a:r>
+                        <a:rPr lang="en-US" sz="1600" dirty="0"/>
+                        <a:t>Time (UTC)</a:t>
+                      </a:r>
+                    </a:p>
+                  </a:txBody>
+                  <a:tcPr/>
+                </a:tc>
+                <a:extLst>
+                  <a:ext uri="{0D108BD9-81ED-4DB2-BD59-A6C34878D82A}">
+                    <a16:rowId xmlns:a16="http://schemas.microsoft.com/office/drawing/2014/main" val="3602420430"/>
+                  </a:ext>
+                </a:extLst>
+              </a:tr>
+              <a:tr h="370840">
+                <a:tc>
+                  <a:txBody>
+                    <a:bodyPr/>
+                    <a:lstStyle/>
+                    <a:p>
+                      <a:pPr rtl="0" fontAlgn="t">
+                        <a:spcBef>
+                          <a:spcPts val="0"/>
+                        </a:spcBef>
+                        <a:spcAft>
+                          <a:spcPts val="0"/>
+                        </a:spcAft>
+                      </a:pPr>
+                      <a:r>
+                        <a:rPr lang="en-US" sz="1600" b="0" i="0" u="none" strike="noStrike" dirty="0">
+                          <a:solidFill>
+                            <a:srgbClr val="000000"/>
+                          </a:solidFill>
+                          <a:effectLst/>
+                          <a:latin typeface="Arial" panose="020B0604020202020204" pitchFamily="34" charset="0"/>
+                        </a:rPr>
+                        <a:t>2:30pm-2:35pm</a:t>
+                      </a:r>
+                      <a:endParaRPr lang="en-US" sz="3600" dirty="0">
+                        <a:effectLst/>
+                      </a:endParaRPr>
+                    </a:p>
+                  </a:txBody>
+                  <a:tcPr marL="63500" marR="63500" marT="63500" marB="63500"/>
+                </a:tc>
+                <a:tc>
+                  <a:txBody>
+                    <a:bodyPr/>
+                    <a:lstStyle/>
+                    <a:p>
+                      <a:pPr>
+                        <a:lnSpc>
+                          <a:spcPct val="100000"/>
+                        </a:lnSpc>
+                      </a:pPr>
+                      <a:r>
+                        <a:rPr lang="en-US" sz="1600" dirty="0"/>
+                        <a:t>00</a:t>
+                      </a:r>
+                    </a:p>
+                  </a:txBody>
+                  <a:tcPr/>
+                </a:tc>
+                <a:tc>
+                  <a:txBody>
+                    <a:bodyPr/>
+                    <a:lstStyle/>
+                    <a:p>
+                      <a:pPr>
+                        <a:lnSpc>
+                          <a:spcPct val="100000"/>
+                        </a:lnSpc>
+                      </a:pPr>
+                      <a:r>
+                        <a:rPr lang="en-US" sz="1600" b="0" i="0" u="none" strike="noStrike" kern="1200" dirty="0">
+                          <a:solidFill>
+                            <a:schemeClr val="dk1"/>
+                          </a:solidFill>
+                          <a:effectLst/>
+                          <a:latin typeface="+mn-lt"/>
+                          <a:ea typeface="+mn-ea"/>
+                          <a:cs typeface="+mn-cs"/>
+                        </a:rPr>
+                        <a:t>Introduction</a:t>
+                      </a:r>
+                      <a:endParaRPr lang="en-US" sz="1600" dirty="0"/>
+                    </a:p>
+                  </a:txBody>
+                  <a:tcPr/>
+                </a:tc>
+                <a:tc>
+                  <a:txBody>
+                    <a:bodyPr/>
+                    <a:lstStyle/>
+                    <a:p>
+                      <a:pPr>
+                        <a:lnSpc>
+                          <a:spcPct val="100000"/>
+                        </a:lnSpc>
+                      </a:pPr>
+                      <a:r>
+                        <a:rPr lang="en-US" sz="1600" dirty="0"/>
+                        <a:t>David E. Bernholdt, ORNL</a:t>
+                      </a:r>
+                    </a:p>
+                  </a:txBody>
+                  <a:tcPr/>
+                </a:tc>
+                <a:tc>
+                  <a:txBody>
+                    <a:bodyPr/>
+                    <a:lstStyle/>
+                    <a:p>
+                      <a:pPr>
+                        <a:lnSpc>
+                          <a:spcPct val="100000"/>
+                        </a:lnSpc>
+                      </a:pPr>
+                      <a:r>
+                        <a:rPr lang="en-US" sz="1600" dirty="0"/>
+                        <a:t>19:30-19:35</a:t>
+                      </a:r>
+                    </a:p>
+                  </a:txBody>
+                  <a:tcPr/>
+                </a:tc>
+                <a:extLst>
+                  <a:ext uri="{0D108BD9-81ED-4DB2-BD59-A6C34878D82A}">
+                    <a16:rowId xmlns:a16="http://schemas.microsoft.com/office/drawing/2014/main" val="4236476034"/>
+                  </a:ext>
+                </a:extLst>
+              </a:tr>
+              <a:tr h="370840">
+                <a:tc>
+                  <a:txBody>
+                    <a:bodyPr/>
+                    <a:lstStyle/>
+                    <a:p>
+                      <a:pPr rtl="0" fontAlgn="t">
+                        <a:spcBef>
+                          <a:spcPts val="0"/>
+                        </a:spcBef>
+                        <a:spcAft>
+                          <a:spcPts val="0"/>
+                        </a:spcAft>
+                      </a:pPr>
+                      <a:r>
+                        <a:rPr lang="en-US" sz="1600" b="0" i="0" u="none" strike="noStrike" dirty="0">
+                          <a:solidFill>
+                            <a:srgbClr val="000000"/>
+                          </a:solidFill>
+                          <a:effectLst/>
+                          <a:latin typeface="Arial" panose="020B0604020202020204" pitchFamily="34" charset="0"/>
+                        </a:rPr>
+                        <a:t>2:35pm-2:45pm</a:t>
+                      </a:r>
+                      <a:endParaRPr lang="en-US" sz="3600" dirty="0">
+                        <a:effectLst/>
+                      </a:endParaRPr>
+                    </a:p>
+                  </a:txBody>
+                  <a:tcPr marL="63500" marR="63500" marT="63500" marB="63500"/>
+                </a:tc>
+                <a:tc>
+                  <a:txBody>
+                    <a:bodyPr/>
+                    <a:lstStyle/>
+                    <a:p>
+                      <a:pPr marL="0" marR="0" lvl="0" indent="0" algn="l" defTabSz="914400" rtl="0" eaLnBrk="1" fontAlgn="auto" latinLnBrk="0" hangingPunct="1">
+                        <a:lnSpc>
+                          <a:spcPct val="100000"/>
+                        </a:lnSpc>
+                        <a:spcBef>
+                          <a:spcPts val="0"/>
+                        </a:spcBef>
+                        <a:spcAft>
+                          <a:spcPts val="0"/>
+                        </a:spcAft>
+                        <a:buClrTx/>
+                        <a:buSzTx/>
+                        <a:buFontTx/>
+                        <a:buNone/>
+                        <a:tabLst/>
+                        <a:defRPr/>
+                      </a:pPr>
+                      <a:r>
+                        <a:rPr lang="en-US" sz="1600" dirty="0"/>
+                        <a:t>01</a:t>
+                      </a:r>
+                    </a:p>
+                  </a:txBody>
+                  <a:tcPr/>
+                </a:tc>
+                <a:tc>
+                  <a:txBody>
+                    <a:bodyPr/>
+                    <a:lstStyle/>
+                    <a:p>
+                      <a:pPr marL="0" marR="0" lvl="0" indent="0" algn="l" defTabSz="914400" rtl="0" eaLnBrk="1" fontAlgn="auto" latinLnBrk="0" hangingPunct="1">
+                        <a:lnSpc>
+                          <a:spcPct val="100000"/>
+                        </a:lnSpc>
+                        <a:spcBef>
+                          <a:spcPts val="0"/>
+                        </a:spcBef>
+                        <a:spcAft>
+                          <a:spcPts val="0"/>
+                        </a:spcAft>
+                        <a:buClrTx/>
+                        <a:buSzTx/>
+                        <a:buFontTx/>
+                        <a:buNone/>
+                        <a:tabLst/>
+                        <a:defRPr/>
+                      </a:pPr>
+                      <a:r>
+                        <a:rPr lang="en-US" sz="1600" b="0" i="0" u="none" strike="noStrike" kern="1200" dirty="0">
+                          <a:solidFill>
+                            <a:schemeClr val="dk1"/>
+                          </a:solidFill>
+                          <a:effectLst/>
+                          <a:latin typeface="+mn-lt"/>
+                          <a:ea typeface="+mn-ea"/>
+                          <a:cs typeface="+mn-cs"/>
+                        </a:rPr>
+                        <a:t>Motivation and Overview of Best Practices in HPC Software Development</a:t>
+                      </a:r>
+                      <a:endParaRPr lang="en-US" sz="1600" dirty="0"/>
+                    </a:p>
+                  </a:txBody>
+                  <a:tcPr/>
+                </a:tc>
+                <a:tc>
+                  <a:txBody>
+                    <a:bodyPr/>
+                    <a:lstStyle/>
+                    <a:p>
+                      <a:pPr marL="0" marR="0" lvl="0" indent="0" algn="l" defTabSz="914400" rtl="0" eaLnBrk="1" fontAlgn="auto" latinLnBrk="0" hangingPunct="1">
+                        <a:lnSpc>
+                          <a:spcPct val="100000"/>
+                        </a:lnSpc>
+                        <a:spcBef>
+                          <a:spcPts val="0"/>
+                        </a:spcBef>
+                        <a:spcAft>
+                          <a:spcPts val="0"/>
+                        </a:spcAft>
+                        <a:buClrTx/>
+                        <a:buSzTx/>
+                        <a:buFontTx/>
+                        <a:buNone/>
+                        <a:tabLst/>
+                        <a:defRPr/>
+                      </a:pPr>
+                      <a:r>
+                        <a:rPr lang="en-US" sz="1600" dirty="0"/>
+                        <a:t>David E. Bernholdt, ORNL</a:t>
+                      </a:r>
+                    </a:p>
+                  </a:txBody>
+                  <a:tcPr/>
+                </a:tc>
+                <a:tc>
+                  <a:txBody>
+                    <a:bodyPr/>
+                    <a:lstStyle/>
+                    <a:p>
+                      <a:pPr marL="0" marR="0" lvl="0" indent="0" algn="l" defTabSz="914400" rtl="0" eaLnBrk="1" fontAlgn="auto" latinLnBrk="0" hangingPunct="1">
+                        <a:lnSpc>
+                          <a:spcPct val="100000"/>
+                        </a:lnSpc>
+                        <a:spcBef>
+                          <a:spcPts val="0"/>
+                        </a:spcBef>
+                        <a:spcAft>
+                          <a:spcPts val="0"/>
+                        </a:spcAft>
+                        <a:buClrTx/>
+                        <a:buSzTx/>
+                        <a:buFontTx/>
+                        <a:buNone/>
+                        <a:tabLst/>
+                        <a:defRPr/>
+                      </a:pPr>
+                      <a:r>
+                        <a:rPr lang="en-US" sz="1600" dirty="0"/>
+                        <a:t>19:35-19:45</a:t>
+                      </a:r>
+                    </a:p>
+                  </a:txBody>
+                  <a:tcPr/>
+                </a:tc>
+                <a:extLst>
+                  <a:ext uri="{0D108BD9-81ED-4DB2-BD59-A6C34878D82A}">
+                    <a16:rowId xmlns:a16="http://schemas.microsoft.com/office/drawing/2014/main" val="18592124"/>
+                  </a:ext>
+                </a:extLst>
+              </a:tr>
+              <a:tr h="370840">
+                <a:tc>
+                  <a:txBody>
+                    <a:bodyPr/>
+                    <a:lstStyle/>
+                    <a:p>
+                      <a:pPr rtl="0" fontAlgn="t">
+                        <a:spcBef>
+                          <a:spcPts val="0"/>
+                        </a:spcBef>
+                        <a:spcAft>
+                          <a:spcPts val="0"/>
+                        </a:spcAft>
+                      </a:pPr>
+                      <a:r>
+                        <a:rPr lang="en-US" sz="1600" b="0" i="0" u="none" strike="noStrike" dirty="0">
+                          <a:solidFill>
+                            <a:srgbClr val="000000"/>
+                          </a:solidFill>
+                          <a:effectLst/>
+                          <a:latin typeface="Arial" panose="020B0604020202020204" pitchFamily="34" charset="0"/>
+                        </a:rPr>
+                        <a:t>2:45pm-3:15pm</a:t>
+                      </a:r>
+                      <a:endParaRPr lang="en-US" sz="3600" dirty="0">
+                        <a:effectLst/>
+                      </a:endParaRPr>
+                    </a:p>
+                  </a:txBody>
+                  <a:tcPr marL="63500" marR="63500" marT="63500" marB="63500"/>
+                </a:tc>
+                <a:tc>
+                  <a:txBody>
+                    <a:bodyPr/>
+                    <a:lstStyle/>
+                    <a:p>
+                      <a:pPr>
+                        <a:lnSpc>
+                          <a:spcPct val="100000"/>
+                        </a:lnSpc>
+                      </a:pPr>
+                      <a:r>
+                        <a:rPr lang="en-US" sz="1600" dirty="0"/>
+                        <a:t>02</a:t>
+                      </a:r>
+                    </a:p>
+                  </a:txBody>
+                  <a:tcPr/>
+                </a:tc>
+                <a:tc>
+                  <a:txBody>
+                    <a:bodyPr/>
+                    <a:lstStyle/>
+                    <a:p>
+                      <a:pPr>
+                        <a:lnSpc>
+                          <a:spcPct val="100000"/>
+                        </a:lnSpc>
+                      </a:pPr>
+                      <a:r>
+                        <a:rPr lang="en-US" sz="1600" dirty="0"/>
+                        <a:t>Agile Methodologies</a:t>
+                      </a:r>
+                    </a:p>
+                  </a:txBody>
+                  <a:tcPr/>
+                </a:tc>
+                <a:tc>
+                  <a:txBody>
+                    <a:bodyPr/>
+                    <a:lstStyle/>
+                    <a:p>
+                      <a:pPr>
+                        <a:lnSpc>
+                          <a:spcPct val="100000"/>
+                        </a:lnSpc>
+                      </a:pPr>
+                      <a:r>
+                        <a:rPr lang="en-US" sz="1600" dirty="0"/>
+                        <a:t>Rinku Gupta, ANL</a:t>
+                      </a:r>
+                    </a:p>
+                  </a:txBody>
+                  <a:tcPr/>
+                </a:tc>
+                <a:tc>
+                  <a:txBody>
+                    <a:bodyPr/>
+                    <a:lstStyle/>
+                    <a:p>
+                      <a:pPr>
+                        <a:lnSpc>
+                          <a:spcPct val="100000"/>
+                        </a:lnSpc>
+                      </a:pPr>
+                      <a:r>
+                        <a:rPr lang="en-US" sz="1600" dirty="0"/>
+                        <a:t>19:45-20:15</a:t>
+                      </a:r>
+                    </a:p>
+                  </a:txBody>
+                  <a:tcPr/>
+                </a:tc>
+                <a:extLst>
+                  <a:ext uri="{0D108BD9-81ED-4DB2-BD59-A6C34878D82A}">
+                    <a16:rowId xmlns:a16="http://schemas.microsoft.com/office/drawing/2014/main" val="3991164013"/>
+                  </a:ext>
+                </a:extLst>
+              </a:tr>
+              <a:tr h="370840">
+                <a:tc>
+                  <a:txBody>
+                    <a:bodyPr/>
+                    <a:lstStyle/>
+                    <a:p>
+                      <a:pPr rtl="0" fontAlgn="t">
+                        <a:spcBef>
+                          <a:spcPts val="0"/>
+                        </a:spcBef>
+                        <a:spcAft>
+                          <a:spcPts val="0"/>
+                        </a:spcAft>
+                      </a:pPr>
+                      <a:r>
+                        <a:rPr lang="en-US" sz="1600" dirty="0">
+                          <a:effectLst/>
+                        </a:rPr>
+                        <a:t>3:15pm-3:30pm</a:t>
+                      </a:r>
+                    </a:p>
+                  </a:txBody>
+                  <a:tcPr marL="63500" marR="63500" marT="63500" marB="63500"/>
+                </a:tc>
+                <a:tc>
+                  <a:txBody>
+                    <a:bodyPr/>
+                    <a:lstStyle/>
+                    <a:p>
+                      <a:pPr>
+                        <a:lnSpc>
+                          <a:spcPct val="100000"/>
+                        </a:lnSpc>
+                      </a:pPr>
+                      <a:r>
+                        <a:rPr lang="en-US" sz="1600" i="0" dirty="0">
+                          <a:solidFill>
+                            <a:schemeClr val="tx1"/>
+                          </a:solidFill>
+                        </a:rPr>
+                        <a:t>03</a:t>
+                      </a:r>
+                    </a:p>
+                  </a:txBody>
+                  <a:tcPr/>
+                </a:tc>
+                <a:tc>
+                  <a:txBody>
+                    <a:bodyPr/>
+                    <a:lstStyle/>
+                    <a:p>
+                      <a:pPr marL="0" marR="0" lvl="0" indent="0" algn="l" defTabSz="914400" rtl="0" eaLnBrk="1" fontAlgn="auto" latinLnBrk="0" hangingPunct="1">
+                        <a:lnSpc>
+                          <a:spcPct val="100000"/>
+                        </a:lnSpc>
+                        <a:spcBef>
+                          <a:spcPts val="0"/>
+                        </a:spcBef>
+                        <a:spcAft>
+                          <a:spcPts val="0"/>
+                        </a:spcAft>
+                        <a:buClrTx/>
+                        <a:buSzTx/>
+                        <a:buFontTx/>
+                        <a:buNone/>
+                        <a:tabLst/>
+                        <a:defRPr/>
+                      </a:pPr>
+                      <a:r>
+                        <a:rPr lang="en-US" sz="1600" b="0" i="0" u="none" strike="noStrike" kern="1200" dirty="0">
+                          <a:solidFill>
+                            <a:schemeClr val="dk1"/>
+                          </a:solidFill>
+                          <a:effectLst/>
+                          <a:latin typeface="+mn-lt"/>
+                          <a:ea typeface="+mn-ea"/>
+                          <a:cs typeface="+mn-cs"/>
+                        </a:rPr>
+                        <a:t>Git Workflows</a:t>
+                      </a:r>
+                      <a:endParaRPr lang="en-US" sz="1600" dirty="0"/>
+                    </a:p>
+                  </a:txBody>
+                  <a:tcPr/>
+                </a:tc>
+                <a:tc>
+                  <a:txBody>
+                    <a:bodyPr/>
+                    <a:lstStyle/>
+                    <a:p>
+                      <a:pPr>
+                        <a:lnSpc>
+                          <a:spcPct val="100000"/>
+                        </a:lnSpc>
+                      </a:pPr>
+                      <a:r>
+                        <a:rPr lang="en-US" sz="1600" dirty="0"/>
+                        <a:t>Patricia Grubel, LANL</a:t>
+                      </a:r>
+                    </a:p>
+                  </a:txBody>
+                  <a:tcPr/>
+                </a:tc>
+                <a:tc>
+                  <a:txBody>
+                    <a:bodyPr/>
+                    <a:lstStyle/>
+                    <a:p>
+                      <a:pPr>
+                        <a:lnSpc>
+                          <a:spcPct val="100000"/>
+                        </a:lnSpc>
+                      </a:pPr>
+                      <a:r>
+                        <a:rPr lang="en-US" sz="1600" dirty="0"/>
+                        <a:t>20:15-20:30</a:t>
+                      </a:r>
+                    </a:p>
+                  </a:txBody>
+                  <a:tcPr/>
+                </a:tc>
+                <a:extLst>
+                  <a:ext uri="{0D108BD9-81ED-4DB2-BD59-A6C34878D82A}">
+                    <a16:rowId xmlns:a16="http://schemas.microsoft.com/office/drawing/2014/main" val="1350023114"/>
+                  </a:ext>
+                </a:extLst>
+              </a:tr>
+              <a:tr h="370840">
+                <a:tc>
+                  <a:txBody>
+                    <a:bodyPr/>
+                    <a:lstStyle/>
+                    <a:p>
+                      <a:pPr rtl="0" fontAlgn="t">
+                        <a:spcBef>
+                          <a:spcPts val="0"/>
+                        </a:spcBef>
+                        <a:spcAft>
+                          <a:spcPts val="0"/>
+                        </a:spcAft>
+                      </a:pPr>
+                      <a:r>
+                        <a:rPr lang="en-US" sz="1600" b="0" i="0" u="none" strike="noStrike" dirty="0">
+                          <a:solidFill>
+                            <a:schemeClr val="tx1"/>
+                          </a:solidFill>
+                          <a:effectLst/>
+                          <a:latin typeface="Arial" panose="020B0604020202020204" pitchFamily="34" charset="0"/>
+                        </a:rPr>
+                        <a:t>3:30pm-4:00pm</a:t>
+                      </a:r>
+                      <a:endParaRPr lang="en-US" sz="3600" i="0" dirty="0">
+                        <a:solidFill>
+                          <a:schemeClr val="tx1"/>
+                        </a:solidFill>
+                        <a:effectLst/>
+                      </a:endParaRPr>
+                    </a:p>
+                  </a:txBody>
+                  <a:tcPr marL="63500" marR="63500" marT="63500" marB="63500"/>
+                </a:tc>
+                <a:tc>
+                  <a:txBody>
+                    <a:bodyPr/>
+                    <a:lstStyle/>
+                    <a:p>
+                      <a:pPr>
+                        <a:lnSpc>
+                          <a:spcPct val="100000"/>
+                        </a:lnSpc>
+                      </a:pPr>
+                      <a:r>
+                        <a:rPr lang="en-US" sz="1600" i="0" dirty="0">
+                          <a:solidFill>
+                            <a:schemeClr val="tx1"/>
+                          </a:solidFill>
+                        </a:rPr>
+                        <a:t>04</a:t>
+                      </a:r>
+                    </a:p>
+                  </a:txBody>
+                  <a:tcPr/>
+                </a:tc>
+                <a:tc>
+                  <a:txBody>
+                    <a:bodyPr/>
+                    <a:lstStyle/>
+                    <a:p>
+                      <a:pPr>
+                        <a:lnSpc>
+                          <a:spcPct val="100000"/>
+                        </a:lnSpc>
+                      </a:pPr>
+                      <a:r>
+                        <a:rPr lang="en-US" sz="1600" b="0" i="0" u="none" strike="noStrike" kern="1200" dirty="0">
+                          <a:solidFill>
+                            <a:schemeClr val="tx1"/>
+                          </a:solidFill>
+                          <a:effectLst/>
+                          <a:latin typeface="+mn-lt"/>
+                          <a:ea typeface="+mn-ea"/>
+                          <a:cs typeface="+mn-cs"/>
+                        </a:rPr>
+                        <a:t>Software Design</a:t>
+                      </a:r>
+                      <a:endParaRPr lang="en-US" sz="1600" i="0" dirty="0">
+                        <a:solidFill>
+                          <a:schemeClr val="tx1"/>
+                        </a:solidFill>
+                      </a:endParaRPr>
+                    </a:p>
+                  </a:txBody>
+                  <a:tcPr/>
+                </a:tc>
+                <a:tc>
+                  <a:txBody>
+                    <a:bodyPr/>
+                    <a:lstStyle/>
+                    <a:p>
+                      <a:pPr>
+                        <a:lnSpc>
+                          <a:spcPct val="100000"/>
+                        </a:lnSpc>
+                      </a:pPr>
+                      <a:r>
+                        <a:rPr lang="en-US" sz="1600" i="0" dirty="0">
+                          <a:solidFill>
+                            <a:schemeClr val="tx1"/>
+                          </a:solidFill>
+                        </a:rPr>
+                        <a:t>Anshu Dubey, ANL</a:t>
+                      </a:r>
+                    </a:p>
+                  </a:txBody>
+                  <a:tcPr/>
+                </a:tc>
+                <a:tc>
+                  <a:txBody>
+                    <a:bodyPr/>
+                    <a:lstStyle/>
+                    <a:p>
+                      <a:pPr>
+                        <a:lnSpc>
+                          <a:spcPct val="100000"/>
+                        </a:lnSpc>
+                      </a:pPr>
+                      <a:r>
+                        <a:rPr lang="en-US" sz="1600" i="0" dirty="0">
+                          <a:solidFill>
+                            <a:schemeClr val="tx1"/>
+                          </a:solidFill>
+                        </a:rPr>
+                        <a:t>20:30-21:00</a:t>
+                      </a:r>
+                    </a:p>
+                  </a:txBody>
+                  <a:tcPr/>
+                </a:tc>
+                <a:extLst>
+                  <a:ext uri="{0D108BD9-81ED-4DB2-BD59-A6C34878D82A}">
+                    <a16:rowId xmlns:a16="http://schemas.microsoft.com/office/drawing/2014/main" val="1922613886"/>
+                  </a:ext>
+                </a:extLst>
+              </a:tr>
+              <a:tr h="370840">
+                <a:tc>
+                  <a:txBody>
+                    <a:bodyPr/>
+                    <a:lstStyle/>
+                    <a:p>
+                      <a:pPr rtl="0" fontAlgn="t">
+                        <a:spcBef>
+                          <a:spcPts val="0"/>
+                        </a:spcBef>
+                        <a:spcAft>
+                          <a:spcPts val="0"/>
+                        </a:spcAft>
+                      </a:pPr>
+                      <a:r>
+                        <a:rPr lang="en-US" sz="1600" i="0" dirty="0">
+                          <a:solidFill>
+                            <a:schemeClr val="tx1"/>
+                          </a:solidFill>
+                          <a:effectLst/>
+                        </a:rPr>
+                        <a:t>4:00pm-4:15pm</a:t>
+                      </a:r>
+                    </a:p>
+                  </a:txBody>
+                  <a:tcPr marL="63500" marR="63500" marT="63500" marB="63500"/>
+                </a:tc>
+                <a:tc>
+                  <a:txBody>
+                    <a:bodyPr/>
+                    <a:lstStyle/>
+                    <a:p>
+                      <a:pPr>
+                        <a:lnSpc>
+                          <a:spcPct val="100000"/>
+                        </a:lnSpc>
+                      </a:pPr>
+                      <a:r>
+                        <a:rPr lang="en-US" sz="1600" i="0" dirty="0">
+                          <a:solidFill>
+                            <a:schemeClr val="tx1"/>
+                          </a:solidFill>
+                        </a:rPr>
+                        <a:t>05</a:t>
+                      </a:r>
+                    </a:p>
+                  </a:txBody>
+                  <a:tcPr/>
+                </a:tc>
+                <a:tc>
+                  <a:txBody>
+                    <a:bodyPr/>
+                    <a:lstStyle/>
+                    <a:p>
+                      <a:pPr>
+                        <a:lnSpc>
+                          <a:spcPct val="100000"/>
+                        </a:lnSpc>
+                      </a:pPr>
+                      <a:r>
+                        <a:rPr lang="en-US" sz="1600" i="0" dirty="0">
+                          <a:solidFill>
+                            <a:schemeClr val="tx1"/>
+                          </a:solidFill>
+                        </a:rPr>
+                        <a:t>Software Testing 1</a:t>
+                      </a:r>
+                    </a:p>
+                  </a:txBody>
+                  <a:tcPr/>
+                </a:tc>
+                <a:tc>
+                  <a:txBody>
+                    <a:bodyPr/>
+                    <a:lstStyle/>
+                    <a:p>
+                      <a:pPr marL="0" marR="0" lvl="0" indent="0" algn="l" defTabSz="914400" rtl="0" eaLnBrk="1" fontAlgn="auto" latinLnBrk="0" hangingPunct="1">
+                        <a:lnSpc>
+                          <a:spcPct val="100000"/>
+                        </a:lnSpc>
+                        <a:spcBef>
+                          <a:spcPts val="0"/>
+                        </a:spcBef>
+                        <a:spcAft>
+                          <a:spcPts val="0"/>
+                        </a:spcAft>
+                        <a:buClrTx/>
+                        <a:buSzTx/>
+                        <a:buFontTx/>
+                        <a:buNone/>
+                        <a:tabLst/>
+                        <a:defRPr/>
+                      </a:pPr>
+                      <a:r>
+                        <a:rPr lang="en-US" sz="1600" i="0" dirty="0">
+                          <a:solidFill>
+                            <a:schemeClr val="tx1"/>
+                          </a:solidFill>
+                        </a:rPr>
+                        <a:t>Rinku Gupta, ANL</a:t>
+                      </a:r>
+                    </a:p>
+                  </a:txBody>
+                  <a:tcPr/>
+                </a:tc>
+                <a:tc>
+                  <a:txBody>
+                    <a:bodyPr/>
+                    <a:lstStyle/>
+                    <a:p>
+                      <a:pPr marL="0" marR="0" lvl="0" indent="0" algn="l" defTabSz="914400" rtl="0" eaLnBrk="1" fontAlgn="auto" latinLnBrk="0" hangingPunct="1">
+                        <a:lnSpc>
+                          <a:spcPct val="100000"/>
+                        </a:lnSpc>
+                        <a:spcBef>
+                          <a:spcPts val="0"/>
+                        </a:spcBef>
+                        <a:spcAft>
+                          <a:spcPts val="0"/>
+                        </a:spcAft>
+                        <a:buClrTx/>
+                        <a:buSzTx/>
+                        <a:buFontTx/>
+                        <a:buNone/>
+                        <a:tabLst/>
+                        <a:defRPr/>
+                      </a:pPr>
+                      <a:r>
+                        <a:rPr lang="en-US" sz="1600" i="0" dirty="0">
+                          <a:solidFill>
+                            <a:schemeClr val="tx1"/>
+                          </a:solidFill>
+                        </a:rPr>
+                        <a:t>21:00-21:15</a:t>
+                      </a:r>
+                    </a:p>
+                  </a:txBody>
+                  <a:tcPr/>
+                </a:tc>
+                <a:extLst>
+                  <a:ext uri="{0D108BD9-81ED-4DB2-BD59-A6C34878D82A}">
+                    <a16:rowId xmlns:a16="http://schemas.microsoft.com/office/drawing/2014/main" val="3073672808"/>
+                  </a:ext>
+                </a:extLst>
+              </a:tr>
+              <a:tr h="370840">
+                <a:tc>
+                  <a:txBody>
+                    <a:bodyPr/>
+                    <a:lstStyle/>
+                    <a:p>
+                      <a:pPr rtl="0" fontAlgn="t">
+                        <a:spcBef>
+                          <a:spcPts val="0"/>
+                        </a:spcBef>
+                        <a:spcAft>
+                          <a:spcPts val="0"/>
+                        </a:spcAft>
+                      </a:pPr>
+                      <a:r>
+                        <a:rPr lang="en-US" sz="1600" b="0" i="1" u="none" strike="noStrike" dirty="0">
+                          <a:solidFill>
+                            <a:schemeClr val="tx2"/>
+                          </a:solidFill>
+                          <a:effectLst/>
+                          <a:latin typeface="Arial" panose="020B0604020202020204" pitchFamily="34" charset="0"/>
+                        </a:rPr>
+                        <a:t>4:15pm-4:35pm</a:t>
+                      </a:r>
+                      <a:endParaRPr lang="en-US" sz="3600" i="1" dirty="0">
+                        <a:solidFill>
+                          <a:schemeClr val="tx2"/>
+                        </a:solidFill>
+                        <a:effectLst/>
+                      </a:endParaRPr>
+                    </a:p>
+                  </a:txBody>
+                  <a:tcPr marL="63500" marR="63500" marT="63500" marB="63500"/>
+                </a:tc>
+                <a:tc>
+                  <a:txBody>
+                    <a:bodyPr/>
+                    <a:lstStyle/>
+                    <a:p>
+                      <a:pPr>
+                        <a:lnSpc>
+                          <a:spcPct val="100000"/>
+                        </a:lnSpc>
+                      </a:pPr>
+                      <a:endParaRPr lang="en-US" sz="1600" i="1" dirty="0">
+                        <a:solidFill>
+                          <a:schemeClr val="tx2"/>
+                        </a:solidFill>
+                      </a:endParaRPr>
+                    </a:p>
+                  </a:txBody>
+                  <a:tcPr/>
+                </a:tc>
+                <a:tc>
+                  <a:txBody>
+                    <a:bodyPr/>
+                    <a:lstStyle/>
+                    <a:p>
+                      <a:pPr>
+                        <a:lnSpc>
+                          <a:spcPct val="100000"/>
+                        </a:lnSpc>
+                      </a:pPr>
+                      <a:r>
+                        <a:rPr lang="en-US" sz="1600" i="1" dirty="0">
+                          <a:solidFill>
+                            <a:schemeClr val="tx2"/>
+                          </a:solidFill>
+                        </a:rPr>
+                        <a:t>Break (live Q&amp;A and demo of Kanban hands-on activities)</a:t>
+                      </a:r>
+                    </a:p>
+                  </a:txBody>
+                  <a:tcPr/>
+                </a:tc>
+                <a:tc>
+                  <a:txBody>
+                    <a:bodyPr/>
+                    <a:lstStyle/>
+                    <a:p>
+                      <a:pPr>
+                        <a:lnSpc>
+                          <a:spcPct val="100000"/>
+                        </a:lnSpc>
+                      </a:pPr>
+                      <a:r>
+                        <a:rPr lang="en-US" sz="1600" i="1" dirty="0">
+                          <a:solidFill>
+                            <a:schemeClr val="tx2"/>
+                          </a:solidFill>
+                        </a:rPr>
+                        <a:t>David E. Bernholdt and All</a:t>
+                      </a:r>
+                    </a:p>
+                  </a:txBody>
+                  <a:tcPr/>
+                </a:tc>
+                <a:tc>
+                  <a:txBody>
+                    <a:bodyPr/>
+                    <a:lstStyle/>
+                    <a:p>
+                      <a:pPr>
+                        <a:lnSpc>
+                          <a:spcPct val="100000"/>
+                        </a:lnSpc>
+                      </a:pPr>
+                      <a:r>
+                        <a:rPr lang="en-US" sz="1600" i="1" dirty="0">
+                          <a:solidFill>
+                            <a:schemeClr val="tx2"/>
+                          </a:solidFill>
+                        </a:rPr>
+                        <a:t>21:15-21:35</a:t>
+                      </a:r>
+                    </a:p>
+                  </a:txBody>
+                  <a:tcPr/>
+                </a:tc>
+                <a:extLst>
+                  <a:ext uri="{0D108BD9-81ED-4DB2-BD59-A6C34878D82A}">
+                    <a16:rowId xmlns:a16="http://schemas.microsoft.com/office/drawing/2014/main" val="4193880066"/>
+                  </a:ext>
+                </a:extLst>
+              </a:tr>
+              <a:tr h="370840">
+                <a:tc>
+                  <a:txBody>
+                    <a:bodyPr/>
+                    <a:lstStyle/>
+                    <a:p>
+                      <a:pPr rtl="0" fontAlgn="t">
+                        <a:spcBef>
+                          <a:spcPts val="0"/>
+                        </a:spcBef>
+                        <a:spcAft>
+                          <a:spcPts val="0"/>
+                        </a:spcAft>
+                      </a:pPr>
+                      <a:r>
+                        <a:rPr lang="en-US" sz="1600" b="0" i="0" u="none" strike="noStrike" dirty="0">
+                          <a:solidFill>
+                            <a:srgbClr val="000000"/>
+                          </a:solidFill>
+                          <a:effectLst/>
+                          <a:latin typeface="Arial" panose="020B0604020202020204" pitchFamily="34" charset="0"/>
+                        </a:rPr>
+                        <a:t>4:35pm-4:50pm</a:t>
+                      </a:r>
+                      <a:endParaRPr lang="en-US" sz="3600" dirty="0">
+                        <a:effectLst/>
+                      </a:endParaRPr>
+                    </a:p>
+                  </a:txBody>
+                  <a:tcPr marL="63500" marR="63500" marT="63500" marB="63500"/>
+                </a:tc>
+                <a:tc>
+                  <a:txBody>
+                    <a:bodyPr/>
+                    <a:lstStyle/>
+                    <a:p>
+                      <a:pPr>
+                        <a:lnSpc>
+                          <a:spcPct val="100000"/>
+                        </a:lnSpc>
+                      </a:pPr>
+                      <a:r>
+                        <a:rPr lang="en-US" sz="1600" i="0" dirty="0"/>
+                        <a:t>06</a:t>
+                      </a:r>
+                    </a:p>
+                  </a:txBody>
+                  <a:tcPr/>
+                </a:tc>
+                <a:tc>
+                  <a:txBody>
+                    <a:bodyPr/>
+                    <a:lstStyle/>
+                    <a:p>
+                      <a:pPr>
+                        <a:lnSpc>
+                          <a:spcPct val="100000"/>
+                        </a:lnSpc>
+                      </a:pPr>
+                      <a:r>
+                        <a:rPr lang="en-US" sz="1600" i="0" dirty="0"/>
+                        <a:t>Software Testing 2</a:t>
+                      </a:r>
+                    </a:p>
+                  </a:txBody>
+                  <a:tcPr/>
+                </a:tc>
+                <a:tc>
+                  <a:txBody>
+                    <a:bodyPr/>
+                    <a:lstStyle/>
+                    <a:p>
+                      <a:pPr>
+                        <a:lnSpc>
+                          <a:spcPct val="100000"/>
+                        </a:lnSpc>
+                      </a:pPr>
+                      <a:r>
+                        <a:rPr lang="en-US" sz="1600" dirty="0"/>
+                        <a:t>Anshu Dubey, ANL</a:t>
+                      </a:r>
+                    </a:p>
+                  </a:txBody>
+                  <a:tcPr/>
+                </a:tc>
+                <a:tc>
+                  <a:txBody>
+                    <a:bodyPr/>
+                    <a:lstStyle/>
+                    <a:p>
+                      <a:pPr>
+                        <a:lnSpc>
+                          <a:spcPct val="100000"/>
+                        </a:lnSpc>
+                      </a:pPr>
+                      <a:r>
+                        <a:rPr lang="en-US" sz="1600" dirty="0"/>
+                        <a:t>21:35-21:50</a:t>
+                      </a:r>
+                    </a:p>
+                  </a:txBody>
+                  <a:tcPr/>
+                </a:tc>
+                <a:extLst>
+                  <a:ext uri="{0D108BD9-81ED-4DB2-BD59-A6C34878D82A}">
+                    <a16:rowId xmlns:a16="http://schemas.microsoft.com/office/drawing/2014/main" val="2444169840"/>
+                  </a:ext>
+                </a:extLst>
+              </a:tr>
+              <a:tr h="370840">
+                <a:tc>
+                  <a:txBody>
+                    <a:bodyPr/>
+                    <a:lstStyle/>
+                    <a:p>
+                      <a:pPr rtl="0" fontAlgn="t">
+                        <a:spcBef>
+                          <a:spcPts val="0"/>
+                        </a:spcBef>
+                        <a:spcAft>
+                          <a:spcPts val="0"/>
+                        </a:spcAft>
+                      </a:pPr>
+                      <a:r>
+                        <a:rPr lang="en-US" sz="1600" dirty="0">
+                          <a:effectLst/>
+                        </a:rPr>
+                        <a:t>4:50pm-5:35pm</a:t>
+                      </a:r>
+                    </a:p>
+                  </a:txBody>
+                  <a:tcPr marL="63500" marR="63500" marT="63500" marB="63500"/>
+                </a:tc>
+                <a:tc>
+                  <a:txBody>
+                    <a:bodyPr/>
+                    <a:lstStyle/>
+                    <a:p>
+                      <a:pPr>
+                        <a:lnSpc>
+                          <a:spcPct val="100000"/>
+                        </a:lnSpc>
+                      </a:pPr>
+                      <a:r>
+                        <a:rPr lang="en-US" sz="1600" i="0" dirty="0"/>
+                        <a:t>07</a:t>
+                      </a:r>
+                    </a:p>
+                  </a:txBody>
+                  <a:tcPr/>
+                </a:tc>
+                <a:tc>
+                  <a:txBody>
+                    <a:bodyPr/>
+                    <a:lstStyle/>
+                    <a:p>
+                      <a:pPr>
+                        <a:lnSpc>
+                          <a:spcPct val="100000"/>
+                        </a:lnSpc>
+                      </a:pPr>
+                      <a:r>
+                        <a:rPr lang="en-US" sz="1600" i="0" dirty="0"/>
+                        <a:t>Refactoring</a:t>
+                      </a:r>
+                    </a:p>
+                  </a:txBody>
+                  <a:tcPr/>
+                </a:tc>
+                <a:tc>
+                  <a:txBody>
+                    <a:bodyPr/>
+                    <a:lstStyle/>
+                    <a:p>
+                      <a:pPr marL="0" marR="0" lvl="0" indent="0" algn="l" defTabSz="914400" rtl="0" eaLnBrk="1" fontAlgn="auto" latinLnBrk="0" hangingPunct="1">
+                        <a:lnSpc>
+                          <a:spcPct val="100000"/>
+                        </a:lnSpc>
+                        <a:spcBef>
+                          <a:spcPts val="0"/>
+                        </a:spcBef>
+                        <a:spcAft>
+                          <a:spcPts val="0"/>
+                        </a:spcAft>
+                        <a:buClrTx/>
+                        <a:buSzTx/>
+                        <a:buFontTx/>
+                        <a:buNone/>
+                        <a:tabLst/>
+                        <a:defRPr/>
+                      </a:pPr>
+                      <a:r>
+                        <a:rPr lang="en-US" sz="1600" i="0" dirty="0">
+                          <a:solidFill>
+                            <a:schemeClr val="tx1"/>
+                          </a:solidFill>
+                        </a:rPr>
+                        <a:t>Anshu Dubey, ANL</a:t>
+                      </a:r>
+                    </a:p>
+                  </a:txBody>
+                  <a:tcPr/>
+                </a:tc>
+                <a:tc>
+                  <a:txBody>
+                    <a:bodyPr/>
+                    <a:lstStyle/>
+                    <a:p>
+                      <a:pPr marL="0" marR="0" lvl="0" indent="0" algn="l" defTabSz="914400" rtl="0" eaLnBrk="1" fontAlgn="auto" latinLnBrk="0" hangingPunct="1">
+                        <a:lnSpc>
+                          <a:spcPct val="100000"/>
+                        </a:lnSpc>
+                        <a:spcBef>
+                          <a:spcPts val="0"/>
+                        </a:spcBef>
+                        <a:spcAft>
+                          <a:spcPts val="0"/>
+                        </a:spcAft>
+                        <a:buClrTx/>
+                        <a:buSzTx/>
+                        <a:buFontTx/>
+                        <a:buNone/>
+                        <a:tabLst/>
+                        <a:defRPr/>
+                      </a:pPr>
+                      <a:r>
+                        <a:rPr lang="en-US" sz="1600" i="0" dirty="0">
+                          <a:solidFill>
+                            <a:schemeClr val="tx1"/>
+                          </a:solidFill>
+                        </a:rPr>
+                        <a:t>21:50-22:35</a:t>
+                      </a:r>
+                    </a:p>
+                  </a:txBody>
+                  <a:tcPr/>
+                </a:tc>
+                <a:extLst>
+                  <a:ext uri="{0D108BD9-81ED-4DB2-BD59-A6C34878D82A}">
+                    <a16:rowId xmlns:a16="http://schemas.microsoft.com/office/drawing/2014/main" val="387858574"/>
+                  </a:ext>
+                </a:extLst>
+              </a:tr>
+              <a:tr h="370840">
+                <a:tc>
+                  <a:txBody>
+                    <a:bodyPr/>
+                    <a:lstStyle/>
+                    <a:p>
+                      <a:pPr rtl="0" fontAlgn="t">
+                        <a:spcBef>
+                          <a:spcPts val="0"/>
+                        </a:spcBef>
+                        <a:spcAft>
+                          <a:spcPts val="0"/>
+                        </a:spcAft>
+                      </a:pPr>
+                      <a:r>
+                        <a:rPr lang="en-US" sz="1600" dirty="0">
+                          <a:effectLst/>
+                        </a:rPr>
+                        <a:t>5:35pm-5:50pm</a:t>
+                      </a:r>
+                    </a:p>
+                  </a:txBody>
+                  <a:tcPr marL="63500" marR="63500" marT="63500" marB="63500"/>
+                </a:tc>
+                <a:tc>
+                  <a:txBody>
+                    <a:bodyPr/>
+                    <a:lstStyle/>
+                    <a:p>
+                      <a:pPr>
+                        <a:lnSpc>
+                          <a:spcPct val="100000"/>
+                        </a:lnSpc>
+                      </a:pPr>
+                      <a:r>
+                        <a:rPr lang="en-US" sz="1600" i="0" dirty="0"/>
+                        <a:t>08</a:t>
+                      </a:r>
+                    </a:p>
+                  </a:txBody>
+                  <a:tcPr/>
+                </a:tc>
+                <a:tc>
+                  <a:txBody>
+                    <a:bodyPr/>
+                    <a:lstStyle/>
+                    <a:p>
+                      <a:pPr>
+                        <a:lnSpc>
+                          <a:spcPct val="100000"/>
+                        </a:lnSpc>
+                      </a:pPr>
+                      <a:r>
+                        <a:rPr lang="en-US" sz="1600" i="0" dirty="0"/>
+                        <a:t>Continuous Integration</a:t>
+                      </a:r>
+                    </a:p>
+                  </a:txBody>
+                  <a:tcPr/>
+                </a:tc>
+                <a:tc>
+                  <a:txBody>
+                    <a:bodyPr/>
+                    <a:lstStyle/>
+                    <a:p>
+                      <a:pPr>
+                        <a:lnSpc>
+                          <a:spcPct val="100000"/>
+                        </a:lnSpc>
+                      </a:pPr>
+                      <a:r>
+                        <a:rPr lang="en-US" sz="1600" dirty="0"/>
+                        <a:t>David E. Bernholdt, ORNL</a:t>
+                      </a:r>
+                    </a:p>
+                  </a:txBody>
+                  <a:tcPr/>
+                </a:tc>
+                <a:tc>
+                  <a:txBody>
+                    <a:bodyPr/>
+                    <a:lstStyle/>
+                    <a:p>
+                      <a:pPr>
+                        <a:lnSpc>
+                          <a:spcPct val="100000"/>
+                        </a:lnSpc>
+                      </a:pPr>
+                      <a:r>
+                        <a:rPr lang="en-US" sz="1600" dirty="0"/>
+                        <a:t>22:35-22:50</a:t>
+                      </a:r>
+                    </a:p>
+                  </a:txBody>
+                  <a:tcPr/>
+                </a:tc>
+                <a:extLst>
+                  <a:ext uri="{0D108BD9-81ED-4DB2-BD59-A6C34878D82A}">
+                    <a16:rowId xmlns:a16="http://schemas.microsoft.com/office/drawing/2014/main" val="2446830301"/>
+                  </a:ext>
+                </a:extLst>
+              </a:tr>
+              <a:tr h="370840">
+                <a:tc>
+                  <a:txBody>
+                    <a:bodyPr/>
+                    <a:lstStyle/>
+                    <a:p>
+                      <a:pPr rtl="0" fontAlgn="t">
+                        <a:spcBef>
+                          <a:spcPts val="0"/>
+                        </a:spcBef>
+                        <a:spcAft>
+                          <a:spcPts val="0"/>
+                        </a:spcAft>
+                      </a:pPr>
+                      <a:r>
+                        <a:rPr lang="en-US" sz="1600" dirty="0">
+                          <a:effectLst/>
+                        </a:rPr>
+                        <a:t>5:50pm-6:05pm</a:t>
+                      </a:r>
+                    </a:p>
+                  </a:txBody>
+                  <a:tcPr marL="63500" marR="63500" marT="63500" marB="63500"/>
+                </a:tc>
+                <a:tc>
+                  <a:txBody>
+                    <a:bodyPr/>
+                    <a:lstStyle/>
+                    <a:p>
+                      <a:pPr>
+                        <a:lnSpc>
+                          <a:spcPct val="100000"/>
+                        </a:lnSpc>
+                      </a:pPr>
+                      <a:r>
+                        <a:rPr lang="en-US" sz="1600" i="0" dirty="0"/>
+                        <a:t>09</a:t>
+                      </a:r>
+                    </a:p>
+                  </a:txBody>
+                  <a:tcPr/>
+                </a:tc>
+                <a:tc>
+                  <a:txBody>
+                    <a:bodyPr/>
+                    <a:lstStyle/>
+                    <a:p>
+                      <a:pPr>
+                        <a:lnSpc>
+                          <a:spcPct val="100000"/>
+                        </a:lnSpc>
+                      </a:pPr>
+                      <a:r>
+                        <a:rPr lang="en-US" sz="1600" i="0" dirty="0"/>
+                        <a:t>Reproducibility</a:t>
+                      </a:r>
+                    </a:p>
+                  </a:txBody>
+                  <a:tcPr/>
+                </a:tc>
+                <a:tc>
+                  <a:txBody>
+                    <a:bodyPr/>
+                    <a:lstStyle/>
+                    <a:p>
+                      <a:pPr>
+                        <a:lnSpc>
+                          <a:spcPct val="100000"/>
+                        </a:lnSpc>
+                      </a:pPr>
+                      <a:r>
+                        <a:rPr lang="en-US" sz="1600" dirty="0"/>
+                        <a:t>Patricia Grubel, LANL</a:t>
+                      </a:r>
+                    </a:p>
+                  </a:txBody>
+                  <a:tcPr/>
+                </a:tc>
+                <a:tc>
+                  <a:txBody>
+                    <a:bodyPr/>
+                    <a:lstStyle/>
+                    <a:p>
+                      <a:pPr>
+                        <a:lnSpc>
+                          <a:spcPct val="100000"/>
+                        </a:lnSpc>
+                      </a:pPr>
+                      <a:r>
+                        <a:rPr lang="en-US" sz="1600" dirty="0"/>
+                        <a:t>22:50-23:05</a:t>
+                      </a:r>
+                    </a:p>
+                  </a:txBody>
+                  <a:tcPr/>
+                </a:tc>
+                <a:extLst>
+                  <a:ext uri="{0D108BD9-81ED-4DB2-BD59-A6C34878D82A}">
+                    <a16:rowId xmlns:a16="http://schemas.microsoft.com/office/drawing/2014/main" val="1746784610"/>
+                  </a:ext>
+                </a:extLst>
+              </a:tr>
+              <a:tr h="370840">
+                <a:tc>
+                  <a:txBody>
+                    <a:bodyPr/>
+                    <a:lstStyle/>
+                    <a:p>
+                      <a:pPr rtl="0" fontAlgn="t">
+                        <a:spcBef>
+                          <a:spcPts val="0"/>
+                        </a:spcBef>
+                        <a:spcAft>
+                          <a:spcPts val="0"/>
+                        </a:spcAft>
+                      </a:pPr>
+                      <a:r>
+                        <a:rPr lang="en-US" sz="1600" dirty="0">
+                          <a:effectLst/>
+                        </a:rPr>
+                        <a:t>6:05pm-6:10pm</a:t>
+                      </a:r>
+                    </a:p>
+                  </a:txBody>
+                  <a:tcPr marL="63500" marR="63500" marT="63500" marB="63500"/>
+                </a:tc>
+                <a:tc>
+                  <a:txBody>
+                    <a:bodyPr/>
+                    <a:lstStyle/>
+                    <a:p>
+                      <a:pPr>
+                        <a:lnSpc>
+                          <a:spcPct val="100000"/>
+                        </a:lnSpc>
+                      </a:pPr>
+                      <a:r>
+                        <a:rPr lang="en-US" sz="1600" i="0" dirty="0"/>
+                        <a:t>10</a:t>
+                      </a:r>
+                    </a:p>
+                  </a:txBody>
+                  <a:tcPr/>
+                </a:tc>
+                <a:tc>
+                  <a:txBody>
+                    <a:bodyPr/>
+                    <a:lstStyle/>
+                    <a:p>
+                      <a:pPr>
+                        <a:lnSpc>
+                          <a:spcPct val="100000"/>
+                        </a:lnSpc>
+                      </a:pPr>
+                      <a:r>
+                        <a:rPr lang="en-US" sz="1600" i="0" dirty="0"/>
+                        <a:t>Summary</a:t>
+                      </a:r>
+                    </a:p>
+                  </a:txBody>
+                  <a:tcPr/>
+                </a:tc>
+                <a:tc>
+                  <a:txBody>
+                    <a:bodyPr/>
+                    <a:lstStyle/>
+                    <a:p>
+                      <a:pPr>
+                        <a:lnSpc>
+                          <a:spcPct val="100000"/>
+                        </a:lnSpc>
+                      </a:pPr>
+                      <a:r>
+                        <a:rPr lang="en-US" sz="1600" dirty="0"/>
+                        <a:t>David E. Bernholdt, ORNL</a:t>
+                      </a:r>
+                    </a:p>
+                  </a:txBody>
+                  <a:tcPr/>
+                </a:tc>
+                <a:tc>
+                  <a:txBody>
+                    <a:bodyPr/>
+                    <a:lstStyle/>
+                    <a:p>
+                      <a:pPr>
+                        <a:lnSpc>
+                          <a:spcPct val="100000"/>
+                        </a:lnSpc>
+                      </a:pPr>
+                      <a:r>
+                        <a:rPr lang="en-US" sz="1600" dirty="0"/>
+                        <a:t>23:05-23:10</a:t>
+                      </a:r>
+                    </a:p>
+                  </a:txBody>
+                  <a:tcPr/>
+                </a:tc>
+                <a:extLst>
+                  <a:ext uri="{0D108BD9-81ED-4DB2-BD59-A6C34878D82A}">
+                    <a16:rowId xmlns:a16="http://schemas.microsoft.com/office/drawing/2014/main" val="127038030"/>
+                  </a:ext>
+                </a:extLst>
+              </a:tr>
+              <a:tr h="370840">
+                <a:tc>
+                  <a:txBody>
+                    <a:bodyPr/>
+                    <a:lstStyle/>
+                    <a:p>
+                      <a:pPr rtl="0" fontAlgn="t">
+                        <a:spcBef>
+                          <a:spcPts val="0"/>
+                        </a:spcBef>
+                        <a:spcAft>
+                          <a:spcPts val="0"/>
+                        </a:spcAft>
+                      </a:pPr>
+                      <a:r>
+                        <a:rPr lang="en-US" sz="1600" i="1" dirty="0">
+                          <a:solidFill>
+                            <a:schemeClr val="tx2"/>
+                          </a:solidFill>
+                          <a:effectLst/>
+                        </a:rPr>
+                        <a:t>6:10pm-6:30pm</a:t>
+                      </a:r>
+                    </a:p>
+                  </a:txBody>
+                  <a:tcPr marL="63500" marR="63500" marT="63500" marB="63500"/>
+                </a:tc>
+                <a:tc>
+                  <a:txBody>
+                    <a:bodyPr/>
+                    <a:lstStyle/>
+                    <a:p>
+                      <a:pPr>
+                        <a:lnSpc>
+                          <a:spcPct val="100000"/>
+                        </a:lnSpc>
+                      </a:pPr>
+                      <a:endParaRPr lang="en-US" sz="1600" i="1" dirty="0">
+                        <a:solidFill>
+                          <a:schemeClr val="tx2"/>
+                        </a:solidFill>
+                      </a:endParaRPr>
+                    </a:p>
+                  </a:txBody>
+                  <a:tcPr/>
+                </a:tc>
+                <a:tc>
+                  <a:txBody>
+                    <a:bodyPr/>
+                    <a:lstStyle/>
+                    <a:p>
+                      <a:pPr>
+                        <a:lnSpc>
+                          <a:spcPct val="100000"/>
+                        </a:lnSpc>
+                      </a:pPr>
+                      <a:r>
+                        <a:rPr lang="en-US" sz="1600" i="1" dirty="0">
+                          <a:solidFill>
+                            <a:schemeClr val="tx2"/>
+                          </a:solidFill>
+                        </a:rPr>
+                        <a:t>Live Q&amp;A and demo of CI hands-on activities</a:t>
+                      </a:r>
+                    </a:p>
+                  </a:txBody>
+                  <a:tcPr/>
+                </a:tc>
+                <a:tc>
+                  <a:txBody>
+                    <a:bodyPr/>
+                    <a:lstStyle/>
+                    <a:p>
+                      <a:pPr>
+                        <a:lnSpc>
+                          <a:spcPct val="100000"/>
+                        </a:lnSpc>
+                      </a:pPr>
+                      <a:r>
+                        <a:rPr lang="en-US" sz="1600" i="1" dirty="0">
+                          <a:solidFill>
+                            <a:schemeClr val="tx2"/>
+                          </a:solidFill>
+                        </a:rPr>
+                        <a:t>David E. Bernholdt and All</a:t>
+                      </a:r>
+                    </a:p>
+                  </a:txBody>
+                  <a:tcPr/>
+                </a:tc>
+                <a:tc>
+                  <a:txBody>
+                    <a:bodyPr/>
+                    <a:lstStyle/>
+                    <a:p>
+                      <a:pPr>
+                        <a:lnSpc>
+                          <a:spcPct val="100000"/>
+                        </a:lnSpc>
+                      </a:pPr>
+                      <a:r>
+                        <a:rPr lang="en-US" sz="1600" i="1" dirty="0">
+                          <a:solidFill>
+                            <a:schemeClr val="tx2"/>
+                          </a:solidFill>
+                        </a:rPr>
+                        <a:t>23:10-23:30</a:t>
+                      </a:r>
+                    </a:p>
+                  </a:txBody>
+                  <a:tcPr/>
+                </a:tc>
+                <a:extLst>
+                  <a:ext uri="{0D108BD9-81ED-4DB2-BD59-A6C34878D82A}">
+                    <a16:rowId xmlns:a16="http://schemas.microsoft.com/office/drawing/2014/main" val="2700633054"/>
+                  </a:ext>
+                </a:extLst>
+              </a:tr>
+            </a:tbl>
+          </a:graphicData>
+        </a:graphic>
+      </p:graphicFrame>
+      <p:sp>
+        <p:nvSpPr>
+          <p:cNvPr id="5" name="Rectangle 4">
+            <a:extLst>
+              <a:ext uri="{FF2B5EF4-FFF2-40B4-BE49-F238E27FC236}">
+                <a16:creationId xmlns:a16="http://schemas.microsoft.com/office/drawing/2014/main" id="{E4880E9D-796B-4059-866B-77E314ECAE90}"/>
+              </a:ext>
+            </a:extLst>
+          </p:cNvPr>
+          <p:cNvSpPr/>
+          <p:nvPr/>
+        </p:nvSpPr>
+        <p:spPr>
+          <a:xfrm>
+            <a:off x="482119" y="6488668"/>
+            <a:ext cx="11224586" cy="369332"/>
+          </a:xfrm>
+          <a:prstGeom prst="rect">
+            <a:avLst/>
+          </a:prstGeom>
+        </p:spPr>
+        <p:txBody>
+          <a:bodyPr wrap="square">
+            <a:spAutoFit/>
+          </a:bodyPr>
+          <a:lstStyle/>
+          <a:p>
+            <a:r>
+              <a:rPr lang="en-US" dirty="0">
+                <a:solidFill>
+                  <a:schemeClr val="accent2"/>
+                </a:solidFill>
+              </a:rPr>
+              <a:t>Please evaluate us: </a:t>
+            </a:r>
+            <a:r>
+              <a:rPr lang="en-US" u="sng" dirty="0">
+                <a:solidFill>
+                  <a:schemeClr val="accent2"/>
+                </a:solidFill>
+                <a:hlinkClick r:id="rId2">
+                  <a:extLst>
+                    <a:ext uri="{A12FA001-AC4F-418D-AE19-62706E023703}">
+                      <ahyp:hlinkClr xmlns:ahyp="http://schemas.microsoft.com/office/drawing/2018/hyperlinkcolor" val="tx"/>
+                    </a:ext>
+                  </a:extLst>
+                </a:hlinkClick>
+              </a:rPr>
+              <a:t>https://submissions.supercomputing.org/?page=Submit&amp;id=TutorialEvaluation&amp;site=sc20</a:t>
+            </a:r>
+            <a:endParaRPr lang="en-US" u="sng" dirty="0">
+              <a:solidFill>
+                <a:schemeClr val="accent2"/>
+              </a:solidFill>
+            </a:endParaRPr>
+          </a:p>
+        </p:txBody>
+      </p:sp>
+    </p:spTree>
+    <p:extLst>
+      <p:ext uri="{BB962C8B-B14F-4D97-AF65-F5344CB8AC3E}">
+        <p14:creationId xmlns:p14="http://schemas.microsoft.com/office/powerpoint/2010/main" val="3051450763"/>
       </p:ext>
     </p:extLst>
   </p:cSld>
@@ -9627,21 +11507,6 @@
 </file>
 
 <file path=customXml/item1.xml><?xml version="1.0" encoding="utf-8"?>
-<?mso-contentType ?>
-<FormTemplates xmlns="http://schemas.microsoft.com/sharepoint/v3/contenttype/forms">
-  <Display>DocumentLibraryForm</Display>
-  <Edit>DocumentLibraryForm</Edit>
-  <New>DocumentLibraryForm</New>
-</FormTemplates>
-</file>
-
-<file path=customXml/item2.xml><?xml version="1.0" encoding="utf-8"?>
-<p:properties xmlns:p="http://schemas.microsoft.com/office/2006/metadata/properties" xmlns:xsi="http://www.w3.org/2001/XMLSchema-instance" xmlns:pc="http://schemas.microsoft.com/office/infopath/2007/PartnerControls">
-  <documentManagement/>
-</p:properties>
-</file>
-
-<file path=customXml/item3.xml><?xml version="1.0" encoding="utf-8"?>
 <ct:contentTypeSchema xmlns:ct="http://schemas.microsoft.com/office/2006/metadata/contentType" xmlns:ma="http://schemas.microsoft.com/office/2006/metadata/properties/metaAttributes" ct:_="" ma:_="" ma:contentTypeName="Document" ma:contentTypeID="0x010100565464437F680748A68B85EB6594EA7D" ma:contentTypeVersion="0" ma:contentTypeDescription="Create a new document." ma:contentTypeScope="" ma:versionID="fe3f4dd58d5914c51cfc6deaa8ad845c">
   <xsd:schema xmlns:xsd="http://www.w3.org/2001/XMLSchema" xmlns:p="http://schemas.microsoft.com/office/2006/metadata/properties" targetNamespace="http://schemas.microsoft.com/office/2006/metadata/properties" ma:root="true" ma:fieldsID="4aeb20c0e3442673af7ee10786458764">
     <xsd:element name="properties">
@@ -9690,10 +11555,32 @@
 </ct:contentTypeSchema>
 </file>
 
+<file path=customXml/item2.xml><?xml version="1.0" encoding="utf-8"?>
+<p:properties xmlns:p="http://schemas.microsoft.com/office/2006/metadata/properties" xmlns:xsi="http://www.w3.org/2001/XMLSchema-instance" xmlns:pc="http://schemas.microsoft.com/office/infopath/2007/PartnerControls">
+  <documentManagement/>
+</p:properties>
+</file>
+
+<file path=customXml/item3.xml><?xml version="1.0" encoding="utf-8"?>
+<?mso-contentType ?>
+<FormTemplates xmlns="http://schemas.microsoft.com/sharepoint/v3/contenttype/forms">
+  <Display>DocumentLibraryForm</Display>
+  <Edit>DocumentLibraryForm</Edit>
+  <New>DocumentLibraryForm</New>
+</FormTemplates>
+</file>
+
 <file path=customXml/itemProps1.xml><?xml version="1.0" encoding="utf-8"?>
-<ds:datastoreItem xmlns:ds="http://schemas.openxmlformats.org/officeDocument/2006/customXml" ds:itemID="{19E20559-B232-4371-8690-E3D8007EDB82}">
+<ds:datastoreItem xmlns:ds="http://schemas.openxmlformats.org/officeDocument/2006/customXml" ds:itemID="{E8DB7DEB-074E-4EE8-9B6E-FD277323109C}">
   <ds:schemaRefs>
-    <ds:schemaRef ds:uri="http://schemas.microsoft.com/sharepoint/v3/contenttype/forms"/>
+    <ds:schemaRef ds:uri="http://schemas.microsoft.com/office/2006/metadata/contentType"/>
+    <ds:schemaRef ds:uri="http://schemas.microsoft.com/office/2006/metadata/properties/metaAttributes"/>
+    <ds:schemaRef ds:uri="http://www.w3.org/2001/XMLSchema"/>
+    <ds:schemaRef ds:uri="http://schemas.microsoft.com/office/2006/metadata/properties"/>
+    <ds:schemaRef ds:uri="http://schemas.openxmlformats.org/package/2006/metadata/core-properties"/>
+    <ds:schemaRef ds:uri="http://purl.org/dc/elements/1.1/"/>
+    <ds:schemaRef ds:uri="http://purl.org/dc/terms/"/>
+    <ds:schemaRef ds:uri="http://schemas.microsoft.com/office/internal/2005/internalDocumentation"/>
   </ds:schemaRefs>
 </ds:datastoreItem>
 </file>
@@ -9714,16 +11601,9 @@
 </file>
 
 <file path=customXml/itemProps3.xml><?xml version="1.0" encoding="utf-8"?>
-<ds:datastoreItem xmlns:ds="http://schemas.openxmlformats.org/officeDocument/2006/customXml" ds:itemID="{E8DB7DEB-074E-4EE8-9B6E-FD277323109C}">
+<ds:datastoreItem xmlns:ds="http://schemas.openxmlformats.org/officeDocument/2006/customXml" ds:itemID="{19E20559-B232-4371-8690-E3D8007EDB82}">
   <ds:schemaRefs>
-    <ds:schemaRef ds:uri="http://schemas.microsoft.com/office/2006/metadata/contentType"/>
-    <ds:schemaRef ds:uri="http://schemas.microsoft.com/office/2006/metadata/properties/metaAttributes"/>
-    <ds:schemaRef ds:uri="http://www.w3.org/2001/XMLSchema"/>
-    <ds:schemaRef ds:uri="http://schemas.microsoft.com/office/2006/metadata/properties"/>
-    <ds:schemaRef ds:uri="http://schemas.openxmlformats.org/package/2006/metadata/core-properties"/>
-    <ds:schemaRef ds:uri="http://purl.org/dc/elements/1.1/"/>
-    <ds:schemaRef ds:uri="http://purl.org/dc/terms/"/>
-    <ds:schemaRef ds:uri="http://schemas.microsoft.com/office/internal/2005/internalDocumentation"/>
+    <ds:schemaRef ds:uri="http://schemas.microsoft.com/sharepoint/v3/contenttype/forms"/>
   </ds:schemaRefs>
 </ds:datastoreItem>
 </file>
</xml_diff>

<commit_message>
Renaming back into standard schema, and SC20 sequence
</commit_message>
<xml_diff>
--- a/presentations/01-overview.pptx
+++ b/presentations/01-overview.pptx
@@ -15,8 +15,8 @@
     <p:sldId id="563" r:id="rId6"/>
     <p:sldId id="1819" r:id="rId7"/>
     <p:sldId id="325" r:id="rId8"/>
-    <p:sldId id="1822" r:id="rId9"/>
-    <p:sldId id="1823" r:id="rId10"/>
+    <p:sldId id="1823" r:id="rId9"/>
+    <p:sldId id="1822" r:id="rId10"/>
     <p:sldId id="1824" r:id="rId11"/>
     <p:sldId id="1846" r:id="rId12"/>
     <p:sldId id="1821" r:id="rId13"/>
@@ -6220,6 +6220,68 @@
               </a:rPr>
               <a:t>The new process costs something to implement, but it pays off over time</a:t>
             </a:r>
+          </a:p>
+        </p:txBody>
+      </p:sp>
+      <p:sp>
+        <p:nvSpPr>
+          <p:cNvPr id="20" name="TextBox 19">
+            <a:extLst>
+              <a:ext uri="{FF2B5EF4-FFF2-40B4-BE49-F238E27FC236}">
+                <a16:creationId xmlns:a16="http://schemas.microsoft.com/office/drawing/2014/main" id="{7793B6FD-77CE-4671-8B2B-B34FC1FA5A19}"/>
+              </a:ext>
+            </a:extLst>
+          </p:cNvPr>
+          <p:cNvSpPr txBox="1"/>
+          <p:nvPr/>
+        </p:nvSpPr>
+        <p:spPr>
+          <a:xfrm>
+            <a:off x="6386607" y="4008800"/>
+            <a:ext cx="5677452" cy="683264"/>
+          </a:xfrm>
+          <a:prstGeom prst="rect">
+            <a:avLst/>
+          </a:prstGeom>
+          <a:noFill/>
+          <a:ln w="25400">
+            <a:solidFill>
+              <a:schemeClr val="tx1"/>
+            </a:solidFill>
+          </a:ln>
+        </p:spPr>
+        <p:txBody>
+          <a:bodyPr wrap="none" lIns="118872" tIns="91440" rIns="118872" bIns="91440" rtlCol="0" anchor="ctr" anchorCtr="0">
+            <a:spAutoFit/>
+          </a:bodyPr>
+          <a:lstStyle/>
+          <a:p>
+            <a:pPr algn="ctr">
+              <a:lnSpc>
+                <a:spcPct val="90000"/>
+              </a:lnSpc>
+            </a:pPr>
+            <a:r>
+              <a:rPr lang="en-US" dirty="0"/>
+              <a:t>Productivity and Sustainability Improvement Planning</a:t>
+            </a:r>
+            <a:endParaRPr lang="en-US" dirty="0">
+              <a:hlinkClick r:id="rId2"/>
+            </a:endParaRPr>
+          </a:p>
+          <a:p>
+            <a:pPr algn="ctr">
+              <a:lnSpc>
+                <a:spcPct val="90000"/>
+              </a:lnSpc>
+            </a:pPr>
+            <a:r>
+              <a:rPr lang="en-US" dirty="0">
+                <a:hlinkClick r:id="rId2"/>
+              </a:rPr>
+              <a:t>https://bssw.io/psip</a:t>
+            </a:r>
+            <a:endParaRPr lang="en-US" dirty="0"/>
           </a:p>
         </p:txBody>
       </p:sp>
@@ -8102,6 +8164,218 @@
           </a:p>
         </p:txBody>
       </p:sp>
+      <p:grpSp>
+        <p:nvGrpSpPr>
+          <p:cNvPr id="6" name="Group 5">
+            <a:extLst>
+              <a:ext uri="{FF2B5EF4-FFF2-40B4-BE49-F238E27FC236}">
+                <a16:creationId xmlns:a16="http://schemas.microsoft.com/office/drawing/2014/main" id="{B9669579-8C6A-4106-9209-D9CA21E1AFAF}"/>
+              </a:ext>
+            </a:extLst>
+          </p:cNvPr>
+          <p:cNvGrpSpPr/>
+          <p:nvPr/>
+        </p:nvGrpSpPr>
+        <p:grpSpPr>
+          <a:xfrm>
+            <a:off x="79513" y="1990146"/>
+            <a:ext cx="12029799" cy="390939"/>
+            <a:chOff x="79513" y="1653208"/>
+            <a:chExt cx="12029799" cy="390939"/>
+          </a:xfrm>
+        </p:grpSpPr>
+        <p:cxnSp>
+          <p:nvCxnSpPr>
+            <p:cNvPr id="7" name="Straight Connector 6">
+              <a:extLst>
+                <a:ext uri="{FF2B5EF4-FFF2-40B4-BE49-F238E27FC236}">
+                  <a16:creationId xmlns:a16="http://schemas.microsoft.com/office/drawing/2014/main" id="{2DAE54F5-E98A-481E-9F56-46D560D76AAA}"/>
+                </a:ext>
+              </a:extLst>
+            </p:cNvPr>
+            <p:cNvCxnSpPr/>
+            <p:nvPr/>
+          </p:nvCxnSpPr>
+          <p:spPr>
+            <a:xfrm>
+              <a:off x="530679" y="1848678"/>
+              <a:ext cx="11127467" cy="0"/>
+            </a:xfrm>
+            <a:prstGeom prst="line">
+              <a:avLst/>
+            </a:prstGeom>
+            <a:ln w="76200">
+              <a:solidFill>
+                <a:srgbClr val="FF0000"/>
+              </a:solidFill>
+            </a:ln>
+          </p:spPr>
+          <p:style>
+            <a:lnRef idx="1">
+              <a:schemeClr val="accent1"/>
+            </a:lnRef>
+            <a:fillRef idx="0">
+              <a:schemeClr val="accent1"/>
+            </a:fillRef>
+            <a:effectRef idx="0">
+              <a:schemeClr val="accent1"/>
+            </a:effectRef>
+            <a:fontRef idx="minor">
+              <a:schemeClr val="tx1"/>
+            </a:fontRef>
+          </p:style>
+        </p:cxnSp>
+        <p:sp>
+          <p:nvSpPr>
+            <p:cNvPr id="8" name="Arrow: Right 7">
+              <a:extLst>
+                <a:ext uri="{FF2B5EF4-FFF2-40B4-BE49-F238E27FC236}">
+                  <a16:creationId xmlns:a16="http://schemas.microsoft.com/office/drawing/2014/main" id="{A82B5609-8BB6-4280-AC83-8617D3F38825}"/>
+                </a:ext>
+              </a:extLst>
+            </p:cNvPr>
+            <p:cNvSpPr/>
+            <p:nvPr/>
+          </p:nvSpPr>
+          <p:spPr>
+            <a:xfrm>
+              <a:off x="79513" y="1653208"/>
+              <a:ext cx="451166" cy="390939"/>
+            </a:xfrm>
+            <a:prstGeom prst="rightArrow">
+              <a:avLst/>
+            </a:prstGeom>
+            <a:solidFill>
+              <a:srgbClr val="FF0000"/>
+            </a:solidFill>
+            <a:ln>
+              <a:solidFill>
+                <a:srgbClr val="FF0000"/>
+              </a:solidFill>
+            </a:ln>
+            <a:effectLst/>
+            <a:scene3d>
+              <a:camera prst="orthographicFront">
+                <a:rot lat="0" lon="0" rev="0"/>
+              </a:camera>
+              <a:lightRig rig="threePt" dir="t">
+                <a:rot lat="0" lon="0" rev="1200000"/>
+              </a:lightRig>
+            </a:scene3d>
+            <a:sp3d/>
+          </p:spPr>
+          <p:style>
+            <a:lnRef idx="0">
+              <a:schemeClr val="accent1"/>
+            </a:lnRef>
+            <a:fillRef idx="3">
+              <a:schemeClr val="accent1"/>
+            </a:fillRef>
+            <a:effectRef idx="3">
+              <a:schemeClr val="accent1"/>
+            </a:effectRef>
+            <a:fontRef idx="minor">
+              <a:schemeClr val="lt1"/>
+            </a:fontRef>
+          </p:style>
+          <p:txBody>
+            <a:bodyPr rot="0" spcFirstLastPara="0" vertOverflow="overflow" horzOverflow="overflow" vert="horz" wrap="square" lIns="45720" tIns="45720" rIns="45720" bIns="45720" numCol="1" spcCol="0" rtlCol="0" fromWordArt="0" anchor="ctr" anchorCtr="0" forceAA="0" compatLnSpc="1">
+              <a:prstTxWarp prst="textNoShape">
+                <a:avLst/>
+              </a:prstTxWarp>
+              <a:noAutofit/>
+            </a:bodyPr>
+            <a:lstStyle/>
+            <a:p>
+              <a:pPr algn="ctr">
+                <a:lnSpc>
+                  <a:spcPct val="90000"/>
+                </a:lnSpc>
+              </a:pPr>
+              <a:endParaRPr lang="en-US" dirty="0">
+                <a:solidFill>
+                  <a:schemeClr val="tx1"/>
+                </a:solidFill>
+              </a:endParaRPr>
+            </a:p>
+          </p:txBody>
+        </p:sp>
+        <p:sp>
+          <p:nvSpPr>
+            <p:cNvPr id="9" name="Arrow: Right 8">
+              <a:extLst>
+                <a:ext uri="{FF2B5EF4-FFF2-40B4-BE49-F238E27FC236}">
+                  <a16:creationId xmlns:a16="http://schemas.microsoft.com/office/drawing/2014/main" id="{20860F8E-7C48-4618-B27B-31F5DB7564E4}"/>
+                </a:ext>
+              </a:extLst>
+            </p:cNvPr>
+            <p:cNvSpPr/>
+            <p:nvPr/>
+          </p:nvSpPr>
+          <p:spPr>
+            <a:xfrm rot="10800000">
+              <a:off x="11658146" y="1653208"/>
+              <a:ext cx="451166" cy="390939"/>
+            </a:xfrm>
+            <a:prstGeom prst="rightArrow">
+              <a:avLst/>
+            </a:prstGeom>
+            <a:solidFill>
+              <a:srgbClr val="FF0000"/>
+            </a:solidFill>
+            <a:ln>
+              <a:solidFill>
+                <a:srgbClr val="FF0000"/>
+              </a:solidFill>
+            </a:ln>
+            <a:effectLst/>
+            <a:scene3d>
+              <a:camera prst="orthographicFront">
+                <a:rot lat="0" lon="0" rev="0"/>
+              </a:camera>
+              <a:lightRig rig="threePt" dir="t">
+                <a:rot lat="0" lon="0" rev="1200000"/>
+              </a:lightRig>
+            </a:scene3d>
+            <a:sp3d/>
+          </p:spPr>
+          <p:style>
+            <a:lnRef idx="0">
+              <a:schemeClr val="accent1"/>
+            </a:lnRef>
+            <a:fillRef idx="3">
+              <a:schemeClr val="accent1"/>
+            </a:fillRef>
+            <a:effectRef idx="3">
+              <a:schemeClr val="accent1"/>
+            </a:effectRef>
+            <a:fontRef idx="minor">
+              <a:schemeClr val="lt1"/>
+            </a:fontRef>
+          </p:style>
+          <p:txBody>
+            <a:bodyPr rot="0" spcFirstLastPara="0" vertOverflow="overflow" horzOverflow="overflow" vert="horz" wrap="square" lIns="45720" tIns="45720" rIns="45720" bIns="45720" numCol="1" spcCol="0" rtlCol="0" fromWordArt="0" anchor="ctr" anchorCtr="0" forceAA="0" compatLnSpc="1">
+              <a:prstTxWarp prst="textNoShape">
+                <a:avLst/>
+              </a:prstTxWarp>
+              <a:noAutofit/>
+            </a:bodyPr>
+            <a:lstStyle/>
+            <a:p>
+              <a:pPr algn="ctr">
+                <a:lnSpc>
+                  <a:spcPct val="90000"/>
+                </a:lnSpc>
+              </a:pPr>
+              <a:endParaRPr lang="en-US" dirty="0">
+                <a:solidFill>
+                  <a:schemeClr val="tx1"/>
+                </a:solidFill>
+              </a:endParaRPr>
+            </a:p>
+          </p:txBody>
+        </p:sp>
+      </p:grpSp>
     </p:spTree>
     <p:extLst>
       <p:ext uri="{BB962C8B-B14F-4D97-AF65-F5344CB8AC3E}">
@@ -9323,6 +9597,263 @@
           <p:cNvPr id="2" name="Title 1">
             <a:extLst>
               <a:ext uri="{FF2B5EF4-FFF2-40B4-BE49-F238E27FC236}">
+                <a16:creationId xmlns:a16="http://schemas.microsoft.com/office/drawing/2014/main" id="{4911B305-C6F2-4C36-9A38-F2C17456AE2B}"/>
+              </a:ext>
+            </a:extLst>
+          </p:cNvPr>
+          <p:cNvSpPr>
+            <a:spLocks noGrp="1"/>
+          </p:cNvSpPr>
+          <p:nvPr>
+            <p:ph type="title"/>
+          </p:nvPr>
+        </p:nvSpPr>
+        <p:spPr>
+          <a:xfrm>
+            <a:off x="365761" y="411480"/>
+            <a:ext cx="7749992" cy="914400"/>
+          </a:xfrm>
+        </p:spPr>
+        <p:txBody>
+          <a:bodyPr/>
+          <a:lstStyle/>
+          <a:p>
+            <a:r>
+              <a:rPr lang="en-US" dirty="0"/>
+              <a:t>Scientific Facilities Provide Valuable Resources</a:t>
+            </a:r>
+          </a:p>
+        </p:txBody>
+      </p:sp>
+      <p:sp>
+        <p:nvSpPr>
+          <p:cNvPr id="10" name="Content Placeholder 9">
+            <a:extLst>
+              <a:ext uri="{FF2B5EF4-FFF2-40B4-BE49-F238E27FC236}">
+                <a16:creationId xmlns:a16="http://schemas.microsoft.com/office/drawing/2014/main" id="{DFC96AD3-4FF0-435B-AC4F-F2EE976B850D}"/>
+              </a:ext>
+            </a:extLst>
+          </p:cNvPr>
+          <p:cNvSpPr>
+            <a:spLocks noGrp="1"/>
+          </p:cNvSpPr>
+          <p:nvPr>
+            <p:ph idx="1"/>
+          </p:nvPr>
+        </p:nvSpPr>
+        <p:spPr>
+          <a:xfrm>
+            <a:off x="365761" y="1535565"/>
+            <a:ext cx="7749994" cy="4047778"/>
+          </a:xfrm>
+        </p:spPr>
+        <p:txBody>
+          <a:bodyPr/>
+          <a:lstStyle/>
+          <a:p>
+            <a:r>
+              <a:rPr lang="en-US" dirty="0"/>
+              <a:t>Major supercomputers often cost O($100M)</a:t>
+            </a:r>
+          </a:p>
+          <a:p>
+            <a:r>
+              <a:rPr lang="en-US" dirty="0"/>
+              <a:t>All cost millions more to operate, annually</a:t>
+            </a:r>
+          </a:p>
+          <a:p>
+            <a:r>
+              <a:rPr lang="en-US" dirty="0"/>
+              <a:t>Significant allocations on large supercomputers can be worth millions</a:t>
+            </a:r>
+          </a:p>
+          <a:p>
+            <a:r>
+              <a:rPr lang="en-US" dirty="0"/>
+              <a:t>Even if you don’t pay the $ you have to spend the time and effort to get the allocation</a:t>
+            </a:r>
+          </a:p>
+          <a:p>
+            <a:r>
+              <a:rPr lang="en-US" b="1" u="sng" dirty="0">
+                <a:solidFill>
+                  <a:schemeClr val="tx2"/>
+                </a:solidFill>
+              </a:rPr>
+              <a:t>Sponsors’ concern</a:t>
+            </a:r>
+            <a:r>
+              <a:rPr lang="en-US" b="1" dirty="0">
+                <a:solidFill>
+                  <a:schemeClr val="tx2"/>
+                </a:solidFill>
+              </a:rPr>
+              <a:t>: Are you being a good steward of the resources?</a:t>
+            </a:r>
+          </a:p>
+          <a:p>
+            <a:r>
+              <a:rPr lang="en-US" b="1" u="sng" dirty="0">
+                <a:solidFill>
+                  <a:schemeClr val="tx2"/>
+                </a:solidFill>
+              </a:rPr>
+              <a:t>Your concern</a:t>
+            </a:r>
+            <a:r>
+              <a:rPr lang="en-US" b="1" dirty="0">
+                <a:solidFill>
+                  <a:schemeClr val="tx2"/>
+                </a:solidFill>
+              </a:rPr>
+              <a:t>: Are you getting the most science possible out of your work (aka scientific productivity)?</a:t>
+            </a:r>
+          </a:p>
+        </p:txBody>
+      </p:sp>
+      <p:pic>
+        <p:nvPicPr>
+          <p:cNvPr id="8" name="Picture 7">
+            <a:extLst>
+              <a:ext uri="{FF2B5EF4-FFF2-40B4-BE49-F238E27FC236}">
+                <a16:creationId xmlns:a16="http://schemas.microsoft.com/office/drawing/2014/main" id="{CBF1AD80-AE63-444B-8CCE-A328E711D223}"/>
+              </a:ext>
+            </a:extLst>
+          </p:cNvPr>
+          <p:cNvPicPr>
+            <a:picLocks noChangeAspect="1"/>
+          </p:cNvPicPr>
+          <p:nvPr/>
+        </p:nvPicPr>
+        <p:blipFill>
+          <a:blip r:embed="rId2"/>
+          <a:stretch>
+            <a:fillRect/>
+          </a:stretch>
+        </p:blipFill>
+        <p:spPr>
+          <a:xfrm>
+            <a:off x="8190744" y="2236185"/>
+            <a:ext cx="3703320" cy="1851660"/>
+          </a:xfrm>
+          <a:prstGeom prst="rect">
+            <a:avLst/>
+          </a:prstGeom>
+        </p:spPr>
+      </p:pic>
+      <p:pic>
+        <p:nvPicPr>
+          <p:cNvPr id="9" name="Picture 4" descr="Image result for olcf frontier images">
+            <a:extLst>
+              <a:ext uri="{FF2B5EF4-FFF2-40B4-BE49-F238E27FC236}">
+                <a16:creationId xmlns:a16="http://schemas.microsoft.com/office/drawing/2014/main" id="{96E8923D-49A5-47B3-89A0-1F0743A5BE5A}"/>
+              </a:ext>
+            </a:extLst>
+          </p:cNvPr>
+          <p:cNvPicPr>
+            <a:picLocks noChangeAspect="1" noChangeArrowheads="1"/>
+          </p:cNvPicPr>
+          <p:nvPr/>
+        </p:nvPicPr>
+        <p:blipFill>
+          <a:blip r:embed="rId3" cstate="print">
+            <a:extLst>
+              <a:ext uri="{28A0092B-C50C-407E-A947-70E740481C1C}">
+                <a14:useLocalDpi xmlns:a14="http://schemas.microsoft.com/office/drawing/2010/main" val="0"/>
+              </a:ext>
+            </a:extLst>
+          </a:blip>
+          <a:srcRect/>
+          <a:stretch>
+            <a:fillRect/>
+          </a:stretch>
+        </p:blipFill>
+        <p:spPr bwMode="auto">
+          <a:xfrm>
+            <a:off x="8115754" y="739566"/>
+            <a:ext cx="3707315" cy="1611330"/>
+          </a:xfrm>
+          <a:prstGeom prst="rect">
+            <a:avLst/>
+          </a:prstGeom>
+          <a:noFill/>
+          <a:extLst>
+            <a:ext uri="{909E8E84-426E-40DD-AFC4-6F175D3DCCD1}">
+              <a14:hiddenFill xmlns:a14="http://schemas.microsoft.com/office/drawing/2010/main">
+                <a:solidFill>
+                  <a:srgbClr val="FFFFFF"/>
+                </a:solidFill>
+              </a14:hiddenFill>
+            </a:ext>
+          </a:extLst>
+        </p:spPr>
+      </p:pic>
+      <p:pic>
+        <p:nvPicPr>
+          <p:cNvPr id="7" name="Content Placeholder 3">
+            <a:extLst>
+              <a:ext uri="{FF2B5EF4-FFF2-40B4-BE49-F238E27FC236}">
+                <a16:creationId xmlns:a16="http://schemas.microsoft.com/office/drawing/2014/main" id="{3352E1D0-7C38-486F-8113-805BA100DA8B}"/>
+              </a:ext>
+            </a:extLst>
+          </p:cNvPr>
+          <p:cNvPicPr>
+            <a:picLocks noChangeAspect="1"/>
+          </p:cNvPicPr>
+          <p:nvPr/>
+        </p:nvPicPr>
+        <p:blipFill>
+          <a:blip r:embed="rId4"/>
+          <a:stretch>
+            <a:fillRect/>
+          </a:stretch>
+        </p:blipFill>
+        <p:spPr>
+          <a:xfrm>
+            <a:off x="8190744" y="3973133"/>
+            <a:ext cx="3703320" cy="1902581"/>
+          </a:xfrm>
+          <a:prstGeom prst="rect">
+            <a:avLst/>
+          </a:prstGeom>
+        </p:spPr>
+      </p:pic>
+    </p:spTree>
+    <p:extLst>
+      <p:ext uri="{BB962C8B-B14F-4D97-AF65-F5344CB8AC3E}">
+        <p14:creationId xmlns:p14="http://schemas.microsoft.com/office/powerpoint/2010/main" val="3897380864"/>
+      </p:ext>
+    </p:extLst>
+  </p:cSld>
+  <p:clrMapOvr>
+    <a:masterClrMapping/>
+  </p:clrMapOvr>
+</p:sld>
+</file>
+
+<file path=ppt/slides/slide6.xml><?xml version="1.0" encoding="utf-8"?>
+<p:sld xmlns:a="http://schemas.openxmlformats.org/drawingml/2006/main" xmlns:r="http://schemas.openxmlformats.org/officeDocument/2006/relationships" xmlns:p="http://schemas.openxmlformats.org/presentationml/2006/main">
+  <p:cSld>
+    <p:spTree>
+      <p:nvGrpSpPr>
+        <p:cNvPr id="1" name=""/>
+        <p:cNvGrpSpPr/>
+        <p:nvPr/>
+      </p:nvGrpSpPr>
+      <p:grpSpPr>
+        <a:xfrm>
+          <a:off x="0" y="0"/>
+          <a:ext cx="0" cy="0"/>
+          <a:chOff x="0" y="0"/>
+          <a:chExt cx="0" cy="0"/>
+        </a:xfrm>
+      </p:grpSpPr>
+      <p:sp>
+        <p:nvSpPr>
+          <p:cNvPr id="2" name="Title 1">
+            <a:extLst>
+              <a:ext uri="{FF2B5EF4-FFF2-40B4-BE49-F238E27FC236}">
                 <a16:creationId xmlns:a16="http://schemas.microsoft.com/office/drawing/2014/main" id="{9FBE681E-868C-4362-8CE9-D9277D90945D}"/>
               </a:ext>
             </a:extLst>
@@ -9412,8 +9943,12 @@
           </a:p>
           <a:p>
             <a:r>
+              <a:rPr lang="en-US" b="1" dirty="0"/>
+              <a:t>Poor software design, development and testing practices </a:t>
+            </a:r>
+            <a:r>
               <a:rPr lang="en-US" dirty="0"/>
-              <a:t>Poor software design, development and testing practices allowed flaws that let to at least six cases of substantial radiation overdoses, three fatal</a:t>
+              <a:t>allowed flaws that let to at least six cases of substantial radiation overdoses, three fatal</a:t>
             </a:r>
           </a:p>
         </p:txBody>
@@ -9436,8 +9971,8 @@
         </p:nvSpPr>
         <p:spPr>
           <a:xfrm>
-            <a:off x="6218914" y="1082160"/>
-            <a:ext cx="5531934" cy="821190"/>
+            <a:off x="6218913" y="1082160"/>
+            <a:ext cx="5588581" cy="821190"/>
           </a:xfrm>
         </p:spPr>
         <p:txBody>
@@ -9470,7 +10005,7 @@
         <p:spPr>
           <a:xfrm>
             <a:off x="6218914" y="1903350"/>
-            <a:ext cx="5531934" cy="3373229"/>
+            <a:ext cx="5588582" cy="3373229"/>
           </a:xfrm>
         </p:spPr>
         <p:txBody>
@@ -9491,19 +10026,31 @@
           <a:p>
             <a:r>
               <a:rPr lang="en-US" dirty="0"/>
-              <a:t>One component didn’t follow specifications</a:t>
-            </a:r>
-          </a:p>
-          <a:p>
+              <a:t>One component </a:t>
+            </a:r>
+            <a:r>
+              <a:rPr lang="en-US" b="1" dirty="0"/>
+              <a:t>didn’t follow specifications</a:t>
+            </a:r>
+          </a:p>
+          <a:p>
+            <a:r>
+              <a:rPr lang="en-US" b="1" dirty="0"/>
+              <a:t>Inadequate testing </a:t>
+            </a:r>
             <a:r>
               <a:rPr lang="en-US" dirty="0"/>
-              <a:t>Inadequate testing at the interface</a:t>
+              <a:t>at the interface</a:t>
             </a:r>
           </a:p>
           <a:p>
             <a:r>
               <a:rPr lang="en-US" dirty="0"/>
-              <a:t>Concerns raised earlier in the mission were ignored because they weren’t properly documented </a:t>
+              <a:t>Concerns raised earlier in the mission were ignored because they </a:t>
+            </a:r>
+            <a:r>
+              <a:rPr lang="en-US" b="1" dirty="0"/>
+              <a:t>weren’t properly documented </a:t>
             </a:r>
           </a:p>
         </p:txBody>
@@ -9662,253 +10209,6 @@
 </p:sld>
 </file>
 
-<file path=ppt/slides/slide6.xml><?xml version="1.0" encoding="utf-8"?>
-<p:sld xmlns:a="http://schemas.openxmlformats.org/drawingml/2006/main" xmlns:r="http://schemas.openxmlformats.org/officeDocument/2006/relationships" xmlns:p="http://schemas.openxmlformats.org/presentationml/2006/main">
-  <p:cSld>
-    <p:spTree>
-      <p:nvGrpSpPr>
-        <p:cNvPr id="1" name=""/>
-        <p:cNvGrpSpPr/>
-        <p:nvPr/>
-      </p:nvGrpSpPr>
-      <p:grpSpPr>
-        <a:xfrm>
-          <a:off x="0" y="0"/>
-          <a:ext cx="0" cy="0"/>
-          <a:chOff x="0" y="0"/>
-          <a:chExt cx="0" cy="0"/>
-        </a:xfrm>
-      </p:grpSpPr>
-      <p:sp>
-        <p:nvSpPr>
-          <p:cNvPr id="2" name="Title 1">
-            <a:extLst>
-              <a:ext uri="{FF2B5EF4-FFF2-40B4-BE49-F238E27FC236}">
-                <a16:creationId xmlns:a16="http://schemas.microsoft.com/office/drawing/2014/main" id="{4911B305-C6F2-4C36-9A38-F2C17456AE2B}"/>
-              </a:ext>
-            </a:extLst>
-          </p:cNvPr>
-          <p:cNvSpPr>
-            <a:spLocks noGrp="1"/>
-          </p:cNvSpPr>
-          <p:nvPr>
-            <p:ph type="title"/>
-          </p:nvPr>
-        </p:nvSpPr>
-        <p:spPr>
-          <a:xfrm>
-            <a:off x="365761" y="411480"/>
-            <a:ext cx="7749992" cy="914400"/>
-          </a:xfrm>
-        </p:spPr>
-        <p:txBody>
-          <a:bodyPr/>
-          <a:lstStyle/>
-          <a:p>
-            <a:r>
-              <a:rPr lang="en-US" dirty="0"/>
-              <a:t>Scientific Facilities Provide Valuable Resources</a:t>
-            </a:r>
-          </a:p>
-        </p:txBody>
-      </p:sp>
-      <p:sp>
-        <p:nvSpPr>
-          <p:cNvPr id="10" name="Content Placeholder 9">
-            <a:extLst>
-              <a:ext uri="{FF2B5EF4-FFF2-40B4-BE49-F238E27FC236}">
-                <a16:creationId xmlns:a16="http://schemas.microsoft.com/office/drawing/2014/main" id="{DFC96AD3-4FF0-435B-AC4F-F2EE976B850D}"/>
-              </a:ext>
-            </a:extLst>
-          </p:cNvPr>
-          <p:cNvSpPr>
-            <a:spLocks noGrp="1"/>
-          </p:cNvSpPr>
-          <p:nvPr>
-            <p:ph idx="1"/>
-          </p:nvPr>
-        </p:nvSpPr>
-        <p:spPr>
-          <a:xfrm>
-            <a:off x="365761" y="1737360"/>
-            <a:ext cx="7749994" cy="4047778"/>
-          </a:xfrm>
-        </p:spPr>
-        <p:txBody>
-          <a:bodyPr/>
-          <a:lstStyle/>
-          <a:p>
-            <a:r>
-              <a:rPr lang="en-US" dirty="0"/>
-              <a:t>Major experimental facilities often cost O($1B)</a:t>
-            </a:r>
-          </a:p>
-          <a:p>
-            <a:r>
-              <a:rPr lang="en-US" dirty="0"/>
-              <a:t>Major supercomputers often cost O($100M)</a:t>
-            </a:r>
-          </a:p>
-          <a:p>
-            <a:r>
-              <a:rPr lang="en-US" dirty="0"/>
-              <a:t>All cost millions more to operate, annually</a:t>
-            </a:r>
-          </a:p>
-          <a:p>
-            <a:r>
-              <a:rPr lang="en-US" dirty="0"/>
-              <a:t>Significant allocations on large supercomputers can be worth millions</a:t>
-            </a:r>
-          </a:p>
-          <a:p>
-            <a:r>
-              <a:rPr lang="en-US" dirty="0"/>
-              <a:t>Even if you don’t pay the $ you have to spend the time and effort to get the allocation</a:t>
-            </a:r>
-          </a:p>
-          <a:p>
-            <a:r>
-              <a:rPr lang="en-US" b="1" dirty="0">
-                <a:solidFill>
-                  <a:schemeClr val="tx2"/>
-                </a:solidFill>
-              </a:rPr>
-              <a:t>Are you being a good steward of the resources?</a:t>
-            </a:r>
-          </a:p>
-          <a:p>
-            <a:r>
-              <a:rPr lang="en-US" b="1" dirty="0">
-                <a:solidFill>
-                  <a:schemeClr val="tx2"/>
-                </a:solidFill>
-              </a:rPr>
-              <a:t>Are you getting the most science possible out of your work (aka scientific productivity)?</a:t>
-            </a:r>
-          </a:p>
-        </p:txBody>
-      </p:sp>
-      <p:pic>
-        <p:nvPicPr>
-          <p:cNvPr id="8" name="Picture 7">
-            <a:extLst>
-              <a:ext uri="{FF2B5EF4-FFF2-40B4-BE49-F238E27FC236}">
-                <a16:creationId xmlns:a16="http://schemas.microsoft.com/office/drawing/2014/main" id="{CBF1AD80-AE63-444B-8CCE-A328E711D223}"/>
-              </a:ext>
-            </a:extLst>
-          </p:cNvPr>
-          <p:cNvPicPr>
-            <a:picLocks noChangeAspect="1"/>
-          </p:cNvPicPr>
-          <p:nvPr/>
-        </p:nvPicPr>
-        <p:blipFill>
-          <a:blip r:embed="rId2"/>
-          <a:stretch>
-            <a:fillRect/>
-          </a:stretch>
-        </p:blipFill>
-        <p:spPr>
-          <a:xfrm>
-            <a:off x="8190744" y="2236185"/>
-            <a:ext cx="3703320" cy="1851660"/>
-          </a:xfrm>
-          <a:prstGeom prst="rect">
-            <a:avLst/>
-          </a:prstGeom>
-        </p:spPr>
-      </p:pic>
-      <p:pic>
-        <p:nvPicPr>
-          <p:cNvPr id="9" name="Picture 4" descr="Image result for olcf frontier images">
-            <a:extLst>
-              <a:ext uri="{FF2B5EF4-FFF2-40B4-BE49-F238E27FC236}">
-                <a16:creationId xmlns:a16="http://schemas.microsoft.com/office/drawing/2014/main" id="{96E8923D-49A5-47B3-89A0-1F0743A5BE5A}"/>
-              </a:ext>
-            </a:extLst>
-          </p:cNvPr>
-          <p:cNvPicPr>
-            <a:picLocks noChangeAspect="1" noChangeArrowheads="1"/>
-          </p:cNvPicPr>
-          <p:nvPr/>
-        </p:nvPicPr>
-        <p:blipFill>
-          <a:blip r:embed="rId3" cstate="print">
-            <a:extLst>
-              <a:ext uri="{28A0092B-C50C-407E-A947-70E740481C1C}">
-                <a14:useLocalDpi xmlns:a14="http://schemas.microsoft.com/office/drawing/2010/main" val="0"/>
-              </a:ext>
-            </a:extLst>
-          </a:blip>
-          <a:srcRect/>
-          <a:stretch>
-            <a:fillRect/>
-          </a:stretch>
-        </p:blipFill>
-        <p:spPr bwMode="auto">
-          <a:xfrm>
-            <a:off x="8115754" y="739566"/>
-            <a:ext cx="3707315" cy="1611330"/>
-          </a:xfrm>
-          <a:prstGeom prst="rect">
-            <a:avLst/>
-          </a:prstGeom>
-          <a:noFill/>
-          <a:extLst>
-            <a:ext uri="{909E8E84-426E-40DD-AFC4-6F175D3DCCD1}">
-              <a14:hiddenFill xmlns:a14="http://schemas.microsoft.com/office/drawing/2010/main">
-                <a:solidFill>
-                  <a:srgbClr val="FFFFFF"/>
-                </a:solidFill>
-              </a14:hiddenFill>
-            </a:ext>
-          </a:extLst>
-        </p:spPr>
-      </p:pic>
-      <p:pic>
-        <p:nvPicPr>
-          <p:cNvPr id="7" name="Content Placeholder 3">
-            <a:extLst>
-              <a:ext uri="{FF2B5EF4-FFF2-40B4-BE49-F238E27FC236}">
-                <a16:creationId xmlns:a16="http://schemas.microsoft.com/office/drawing/2014/main" id="{3352E1D0-7C38-486F-8113-805BA100DA8B}"/>
-              </a:ext>
-            </a:extLst>
-          </p:cNvPr>
-          <p:cNvPicPr>
-            <a:picLocks noChangeAspect="1"/>
-          </p:cNvPicPr>
-          <p:nvPr/>
-        </p:nvPicPr>
-        <p:blipFill>
-          <a:blip r:embed="rId4"/>
-          <a:stretch>
-            <a:fillRect/>
-          </a:stretch>
-        </p:blipFill>
-        <p:spPr>
-          <a:xfrm>
-            <a:off x="8190744" y="3973133"/>
-            <a:ext cx="3703320" cy="1902581"/>
-          </a:xfrm>
-          <a:prstGeom prst="rect">
-            <a:avLst/>
-          </a:prstGeom>
-        </p:spPr>
-      </p:pic>
-    </p:spTree>
-    <p:extLst>
-      <p:ext uri="{BB962C8B-B14F-4D97-AF65-F5344CB8AC3E}">
-        <p14:creationId xmlns:p14="http://schemas.microsoft.com/office/powerpoint/2010/main" val="3897380864"/>
-      </p:ext>
-    </p:extLst>
-  </p:cSld>
-  <p:clrMapOvr>
-    <a:masterClrMapping/>
-  </p:clrMapOvr>
-</p:sld>
-</file>
-
 <file path=ppt/slides/slide7.xml><?xml version="1.0" encoding="utf-8"?>
 <p:sld xmlns:a="http://schemas.openxmlformats.org/drawingml/2006/main" xmlns:r="http://schemas.openxmlformats.org/officeDocument/2006/relationships" xmlns:p="http://schemas.openxmlformats.org/presentationml/2006/main" showMasterSp="0">
   <p:cSld>
@@ -10256,7 +10556,7 @@
           <a:p>
             <a:r>
               <a:rPr lang="en-US" dirty="0"/>
-              <a:t>Increases ramp-on time for new developers</a:t>
+              <a:t>Increases ramp-up time for new developers</a:t>
             </a:r>
           </a:p>
           <a:p>
@@ -10555,6 +10855,13 @@
             <a:r>
               <a:rPr lang="en-US" sz="2400" dirty="0"/>
               <a:t>Competing priorities and incentives</a:t>
+            </a:r>
+          </a:p>
+          <a:p>
+            <a:pPr lvl="1"/>
+            <a:r>
+              <a:rPr lang="en-US" sz="2200" dirty="0"/>
+              <a:t>Sponsors often care more about scientific publications than software per se</a:t>
             </a:r>
           </a:p>
           <a:p>
@@ -11507,6 +11814,21 @@
 </file>
 
 <file path=customXml/item1.xml><?xml version="1.0" encoding="utf-8"?>
+<?mso-contentType ?>
+<FormTemplates xmlns="http://schemas.microsoft.com/sharepoint/v3/contenttype/forms">
+  <Display>DocumentLibraryForm</Display>
+  <Edit>DocumentLibraryForm</Edit>
+  <New>DocumentLibraryForm</New>
+</FormTemplates>
+</file>
+
+<file path=customXml/item2.xml><?xml version="1.0" encoding="utf-8"?>
+<p:properties xmlns:p="http://schemas.microsoft.com/office/2006/metadata/properties" xmlns:xsi="http://www.w3.org/2001/XMLSchema-instance" xmlns:pc="http://schemas.microsoft.com/office/infopath/2007/PartnerControls">
+  <documentManagement/>
+</p:properties>
+</file>
+
+<file path=customXml/item3.xml><?xml version="1.0" encoding="utf-8"?>
 <ct:contentTypeSchema xmlns:ct="http://schemas.microsoft.com/office/2006/metadata/contentType" xmlns:ma="http://schemas.microsoft.com/office/2006/metadata/properties/metaAttributes" ct:_="" ma:_="" ma:contentTypeName="Document" ma:contentTypeID="0x010100565464437F680748A68B85EB6594EA7D" ma:contentTypeVersion="0" ma:contentTypeDescription="Create a new document." ma:contentTypeScope="" ma:versionID="fe3f4dd58d5914c51cfc6deaa8ad845c">
   <xsd:schema xmlns:xsd="http://www.w3.org/2001/XMLSchema" xmlns:p="http://schemas.microsoft.com/office/2006/metadata/properties" targetNamespace="http://schemas.microsoft.com/office/2006/metadata/properties" ma:root="true" ma:fieldsID="4aeb20c0e3442673af7ee10786458764">
     <xsd:element name="properties">
@@ -11555,32 +11877,10 @@
 </ct:contentTypeSchema>
 </file>
 
-<file path=customXml/item2.xml><?xml version="1.0" encoding="utf-8"?>
-<p:properties xmlns:p="http://schemas.microsoft.com/office/2006/metadata/properties" xmlns:xsi="http://www.w3.org/2001/XMLSchema-instance" xmlns:pc="http://schemas.microsoft.com/office/infopath/2007/PartnerControls">
-  <documentManagement/>
-</p:properties>
-</file>
-
-<file path=customXml/item3.xml><?xml version="1.0" encoding="utf-8"?>
-<?mso-contentType ?>
-<FormTemplates xmlns="http://schemas.microsoft.com/sharepoint/v3/contenttype/forms">
-  <Display>DocumentLibraryForm</Display>
-  <Edit>DocumentLibraryForm</Edit>
-  <New>DocumentLibraryForm</New>
-</FormTemplates>
-</file>
-
 <file path=customXml/itemProps1.xml><?xml version="1.0" encoding="utf-8"?>
-<ds:datastoreItem xmlns:ds="http://schemas.openxmlformats.org/officeDocument/2006/customXml" ds:itemID="{E8DB7DEB-074E-4EE8-9B6E-FD277323109C}">
+<ds:datastoreItem xmlns:ds="http://schemas.openxmlformats.org/officeDocument/2006/customXml" ds:itemID="{19E20559-B232-4371-8690-E3D8007EDB82}">
   <ds:schemaRefs>
-    <ds:schemaRef ds:uri="http://schemas.microsoft.com/office/2006/metadata/contentType"/>
-    <ds:schemaRef ds:uri="http://schemas.microsoft.com/office/2006/metadata/properties/metaAttributes"/>
-    <ds:schemaRef ds:uri="http://www.w3.org/2001/XMLSchema"/>
-    <ds:schemaRef ds:uri="http://schemas.microsoft.com/office/2006/metadata/properties"/>
-    <ds:schemaRef ds:uri="http://schemas.openxmlformats.org/package/2006/metadata/core-properties"/>
-    <ds:schemaRef ds:uri="http://purl.org/dc/elements/1.1/"/>
-    <ds:schemaRef ds:uri="http://purl.org/dc/terms/"/>
-    <ds:schemaRef ds:uri="http://schemas.microsoft.com/office/internal/2005/internalDocumentation"/>
+    <ds:schemaRef ds:uri="http://schemas.microsoft.com/sharepoint/v3/contenttype/forms"/>
   </ds:schemaRefs>
 </ds:datastoreItem>
 </file>
@@ -11601,9 +11901,16 @@
 </file>
 
 <file path=customXml/itemProps3.xml><?xml version="1.0" encoding="utf-8"?>
-<ds:datastoreItem xmlns:ds="http://schemas.openxmlformats.org/officeDocument/2006/customXml" ds:itemID="{19E20559-B232-4371-8690-E3D8007EDB82}">
+<ds:datastoreItem xmlns:ds="http://schemas.openxmlformats.org/officeDocument/2006/customXml" ds:itemID="{E8DB7DEB-074E-4EE8-9B6E-FD277323109C}">
   <ds:schemaRefs>
-    <ds:schemaRef ds:uri="http://schemas.microsoft.com/sharepoint/v3/contenttype/forms"/>
+    <ds:schemaRef ds:uri="http://schemas.microsoft.com/office/2006/metadata/contentType"/>
+    <ds:schemaRef ds:uri="http://schemas.microsoft.com/office/2006/metadata/properties/metaAttributes"/>
+    <ds:schemaRef ds:uri="http://www.w3.org/2001/XMLSchema"/>
+    <ds:schemaRef ds:uri="http://schemas.microsoft.com/office/2006/metadata/properties"/>
+    <ds:schemaRef ds:uri="http://schemas.openxmlformats.org/package/2006/metadata/core-properties"/>
+    <ds:schemaRef ds:uri="http://purl.org/dc/elements/1.1/"/>
+    <ds:schemaRef ds:uri="http://purl.org/dc/terms/"/>
+    <ds:schemaRef ds:uri="http://schemas.microsoft.com/office/internal/2005/internalDocumentation"/>
   </ds:schemaRefs>
 </ds:datastoreItem>
 </file>
</xml_diff>